<commit_message>
alex teil presi finish
</commit_message>
<xml_diff>
--- a/presentation/Milestone_Presentation - Copy.pptx
+++ b/presentation/Milestone_Presentation - Copy.pptx
@@ -203,7 +203,7 @@
           <a:p>
             <a:fld id="{771077F2-B8AE-4D44-9AB2-A014164F0B23}" type="datetimeFigureOut">
               <a:rPr lang="de-CH" smtClean="0"/>
-              <a:t>01.06.2021</a:t>
+              <a:t>03.06.2021</a:t>
             </a:fld>
             <a:endParaRPr lang="de-CH"/>
           </a:p>
@@ -914,346 +914,51 @@
           <a:lstStyle/>
           <a:p>
             <a:r>
-              <a:rPr lang="de-CH" sz="1200" kern="1200" dirty="0">
+              <a:rPr lang="de-CH" sz="1200" dirty="0">
                 <a:solidFill>
-                  <a:schemeClr val="tx1"/>
+                  <a:srgbClr val="FF4382"/>
                 </a:solidFill>
-                <a:effectLst/>
-                <a:latin typeface="+mn-lt"/>
-                <a:ea typeface="+mn-ea"/>
-                <a:cs typeface="+mn-cs"/>
+                <a:latin typeface="Roboto Medium" panose="02000000000000000000" pitchFamily="2" charset="0"/>
+                <a:ea typeface="Roboto Medium" panose="02000000000000000000" pitchFamily="2" charset="0"/>
               </a:rPr>
-              <a:t>Zu Beginn des Projektes wurde die Aufgabenstellung analysiert und ein Ist-Soll Vergleich erstellt. Somit war klar was umgesetzt werden musste. Die dadurch zu erkennenden Bedürfnisse konnten dann in ein Grobkonzept einfliessen welches später in der Detailkonzeption ausgearbeitet wurde. </a:t>
+              <a:t>SLOW</a:t>
             </a:r>
           </a:p>
           <a:p>
             <a:r>
-              <a:rPr lang="de-CH" sz="1200" kern="1200" dirty="0">
+              <a:rPr lang="de-CH" sz="1200" dirty="0">
                 <a:solidFill>
-                  <a:schemeClr val="tx1"/>
+                  <a:srgbClr val="FF4382"/>
                 </a:solidFill>
-                <a:effectLst/>
-                <a:latin typeface="+mn-lt"/>
-                <a:ea typeface="+mn-ea"/>
-                <a:cs typeface="+mn-cs"/>
+                <a:latin typeface="Roboto Medium" panose="02000000000000000000" pitchFamily="2" charset="0"/>
+                <a:ea typeface="Roboto Medium" panose="02000000000000000000" pitchFamily="2" charset="0"/>
               </a:rPr>
-              <a:t>Da das Grobkonzept durch die Aufgabenstellung schon stark definiert war, konnte schnell mit der Detailkonzeption begonnen werden.  Es entstanden somit mehrere Detailkonzeptionen die jeden Aspekt des Projektes abdecken sollen. </a:t>
+              <a:t>REPETITIVE</a:t>
             </a:r>
           </a:p>
           <a:p>
             <a:r>
-              <a:rPr lang="de-CH" sz="1200" kern="1200" dirty="0">
+              <a:rPr lang="de-CH" sz="1200" dirty="0">
                 <a:solidFill>
-                  <a:schemeClr val="tx1"/>
+                  <a:srgbClr val="FF4382"/>
                 </a:solidFill>
-                <a:effectLst/>
-                <a:latin typeface="+mn-lt"/>
-                <a:ea typeface="+mn-ea"/>
-                <a:cs typeface="+mn-cs"/>
+                <a:latin typeface="Roboto Medium" panose="02000000000000000000" pitchFamily="2" charset="0"/>
+                <a:ea typeface="Roboto Medium" panose="02000000000000000000" pitchFamily="2" charset="0"/>
               </a:rPr>
-              <a:t>Netzwerk:</a:t>
+              <a:t>PRONE TO ERRORS</a:t>
             </a:r>
           </a:p>
           <a:p>
             <a:r>
-              <a:rPr lang="de-CH" sz="1200" kern="1200" dirty="0">
+              <a:rPr lang="de-CH" sz="1200" dirty="0">
                 <a:solidFill>
-                  <a:schemeClr val="tx1"/>
+                  <a:srgbClr val="FF4382"/>
                 </a:solidFill>
-                <a:effectLst/>
-                <a:latin typeface="+mn-lt"/>
-                <a:ea typeface="+mn-ea"/>
-                <a:cs typeface="+mn-cs"/>
+                <a:latin typeface="Roboto Medium" panose="02000000000000000000" pitchFamily="2" charset="0"/>
+                <a:ea typeface="Roboto Medium" panose="02000000000000000000" pitchFamily="2" charset="0"/>
               </a:rPr>
-              <a:t>Zu Beginn wurden Grundlegende Vorgaben an das Netzwerk wie die Namensgebung oder das Adresskonzept geklärt. Mit Hilfe einer Materialliste konnten somit den jeweiligen Geräten je ein Passender und einfacher Name und eine IP-Adresse vergeben werden. Nach dem Sammeln zusätzlicher Informationen zu der Hardware, wie Firmware Version oder OS </a:t>
+              <a:t>DIFFICULT TO INTEGRATE</a:t>
             </a:r>
-            <a:r>
-              <a:rPr lang="de-CH" sz="1200" kern="1200" dirty="0" err="1">
-                <a:solidFill>
-                  <a:schemeClr val="tx1"/>
-                </a:solidFill>
-                <a:effectLst/>
-                <a:latin typeface="+mn-lt"/>
-                <a:ea typeface="+mn-ea"/>
-                <a:cs typeface="+mn-cs"/>
-              </a:rPr>
-              <a:t>Build</a:t>
-            </a:r>
-            <a:r>
-              <a:rPr lang="de-CH" sz="1200" kern="1200" dirty="0">
-                <a:solidFill>
-                  <a:schemeClr val="tx1"/>
-                </a:solidFill>
-                <a:effectLst/>
-                <a:latin typeface="+mn-lt"/>
-                <a:ea typeface="+mn-ea"/>
-                <a:cs typeface="+mn-cs"/>
-              </a:rPr>
-              <a:t> konnte ein Netzwerkplan erstellt werden. Der Netzwerkplan beendete die Konzeption zum physischen Aufbau des Netzwerkes. </a:t>
-            </a:r>
-          </a:p>
-          <a:p>
-            <a:r>
-              <a:rPr lang="de-CH" sz="1200" kern="1200" dirty="0">
-                <a:solidFill>
-                  <a:schemeClr val="tx1"/>
-                </a:solidFill>
-                <a:effectLst/>
-                <a:latin typeface="+mn-lt"/>
-                <a:ea typeface="+mn-ea"/>
-                <a:cs typeface="+mn-cs"/>
-              </a:rPr>
-              <a:t>AD: </a:t>
-            </a:r>
-          </a:p>
-          <a:p>
-            <a:r>
-              <a:rPr lang="de-CH" sz="1200" kern="1200" dirty="0">
-                <a:solidFill>
-                  <a:schemeClr val="tx1"/>
-                </a:solidFill>
-                <a:effectLst/>
-                <a:latin typeface="+mn-lt"/>
-                <a:ea typeface="+mn-ea"/>
-                <a:cs typeface="+mn-cs"/>
-              </a:rPr>
-              <a:t>Für den Aufbau der Active Directory Standen mehrere Vorgehensmöglichkeiten zur Auswahl. Da unser Kunde eine eher kleine Firma ist, ist ein Einzeldomänen-Modell völlig ausreichend. Die Verwaltung von Benutzern, Gruppen, Richtlinien usw. wird somit stark vereinfacht. Ebenfalls fiel die Entscheidung auf einen Objektorientierten Aufbau. Das bedeutet das einzelne Ressourcen nach Objekttyp geordnet wurden uns somit je eine Organisationseinheit für Benutzer, Gruppen, Computer etc. erstellt wurde. </a:t>
-            </a:r>
-          </a:p>
-          <a:p>
-            <a:r>
-              <a:rPr lang="de-CH" sz="1200" kern="1200" dirty="0">
-                <a:solidFill>
-                  <a:schemeClr val="tx1"/>
-                </a:solidFill>
-                <a:effectLst/>
-                <a:latin typeface="+mn-lt"/>
-                <a:ea typeface="+mn-ea"/>
-                <a:cs typeface="+mn-cs"/>
-              </a:rPr>
-              <a:t>Weiter wurden natürlich Richtlinien für </a:t>
-            </a:r>
-            <a:r>
-              <a:rPr lang="de-CH" sz="1200" kern="1200" dirty="0" err="1">
-                <a:solidFill>
-                  <a:schemeClr val="tx1"/>
-                </a:solidFill>
-                <a:effectLst/>
-                <a:latin typeface="+mn-lt"/>
-                <a:ea typeface="+mn-ea"/>
-                <a:cs typeface="+mn-cs"/>
-              </a:rPr>
-              <a:t>Administatoren</a:t>
-            </a:r>
-            <a:r>
-              <a:rPr lang="de-CH" sz="1200" kern="1200" dirty="0">
-                <a:solidFill>
-                  <a:schemeClr val="tx1"/>
-                </a:solidFill>
-                <a:effectLst/>
-                <a:latin typeface="+mn-lt"/>
-                <a:ea typeface="+mn-ea"/>
-                <a:cs typeface="+mn-cs"/>
-              </a:rPr>
-              <a:t> festgelegt und die Domäne benannt. </a:t>
-            </a:r>
-          </a:p>
-          <a:p>
-            <a:r>
-              <a:rPr lang="de-CH" sz="1200" kern="1200" dirty="0">
-                <a:solidFill>
-                  <a:schemeClr val="tx1"/>
-                </a:solidFill>
-                <a:effectLst/>
-                <a:latin typeface="+mn-lt"/>
-                <a:ea typeface="+mn-ea"/>
-                <a:cs typeface="+mn-cs"/>
-              </a:rPr>
-              <a:t>Berechtigung: </a:t>
-            </a:r>
-          </a:p>
-          <a:p>
-            <a:r>
-              <a:rPr lang="de-CH" sz="1200" kern="1200" dirty="0">
-                <a:solidFill>
-                  <a:schemeClr val="tx1"/>
-                </a:solidFill>
-                <a:effectLst/>
-                <a:latin typeface="+mn-lt"/>
-                <a:ea typeface="+mn-ea"/>
-                <a:cs typeface="+mn-cs"/>
-              </a:rPr>
-              <a:t>Berechtigungen werden über die Domäne mittels Gruppenrichtlinien und Freigaben vergeben. Um die Berechtigungen nachvollziehen zu können wurde ein Berechtigungskonzept erstellt welches in Zusammenarbeit mit der Datenablage die Berechtigungen auf einzelne Ordner für diverse Gruppen regelt. Das Berechtigungskonzept legt ebenfalls das erstellen von Netzwerklaufwerken fest. </a:t>
-            </a:r>
-          </a:p>
-          <a:p>
-            <a:r>
-              <a:rPr lang="de-CH" sz="1200" kern="1200" dirty="0">
-                <a:solidFill>
-                  <a:schemeClr val="tx1"/>
-                </a:solidFill>
-                <a:effectLst/>
-                <a:latin typeface="+mn-lt"/>
-                <a:ea typeface="+mn-ea"/>
-                <a:cs typeface="+mn-cs"/>
-              </a:rPr>
-              <a:t>Sicherheit: </a:t>
-            </a:r>
-          </a:p>
-          <a:p>
-            <a:r>
-              <a:rPr lang="de-CH" sz="1200" kern="1200" dirty="0">
-                <a:solidFill>
-                  <a:schemeClr val="tx1"/>
-                </a:solidFill>
-                <a:effectLst/>
-                <a:latin typeface="+mn-lt"/>
-                <a:ea typeface="+mn-ea"/>
-                <a:cs typeface="+mn-cs"/>
-              </a:rPr>
-              <a:t>Die Sicherheit des Netzwerkes ist ein grosses Thema. Ebenfalls ist es ein wichtiges Anliegen für den Auftraggeber. Somit wurden mehrere Massnahmen geplant um ein möglichst Sicheres Netzwerk aufzubauen. Intern ist es hier wichtig zu verhindern das Benutzer auf Daten zugreifen können die nicht für sie bestimmt sind. Mit Gruppenrichtlinien wurde zum Beispiel der Zugriff auf die Datenablage mit Hilfe der Berechtigungsmatrix festgelegt. Ebenfalls wurden Passwortrichtlinien für Administratoren und Benutzer festgelegt welche die Sicherheit immens erhöhen. </a:t>
-            </a:r>
-          </a:p>
-          <a:p>
-            <a:r>
-              <a:rPr lang="de-CH" sz="1200" kern="1200" dirty="0">
-                <a:solidFill>
-                  <a:schemeClr val="tx1"/>
-                </a:solidFill>
-                <a:effectLst/>
-                <a:latin typeface="+mn-lt"/>
-                <a:ea typeface="+mn-ea"/>
-                <a:cs typeface="+mn-cs"/>
-              </a:rPr>
-              <a:t>Durch ein Antivirenprogramm soll der Schutz vor Gefahren von aussen unterstützt werden. Dazu wurden Anforderungen und Aufgaben für das Programm in einem Sicherheitskonzept festgelegt.  </a:t>
-            </a:r>
-          </a:p>
-          <a:p>
-            <a:r>
-              <a:rPr lang="de-CH" sz="1200" kern="1200" dirty="0">
-                <a:solidFill>
-                  <a:schemeClr val="tx1"/>
-                </a:solidFill>
-                <a:effectLst/>
-                <a:latin typeface="+mn-lt"/>
-                <a:ea typeface="+mn-ea"/>
-                <a:cs typeface="+mn-cs"/>
-              </a:rPr>
-              <a:t>Wichtig ist natürlich auch die sichere Handhabung der Hardware. Deshalb wurde für die Assemblierung der Clients Sicherheitsrichtlinien zum ESD-Schutz festgelegt. </a:t>
-            </a:r>
-          </a:p>
-          <a:p>
-            <a:r>
-              <a:rPr lang="de-CH" sz="1200" kern="1200" dirty="0">
-                <a:solidFill>
-                  <a:schemeClr val="tx1"/>
-                </a:solidFill>
-                <a:effectLst/>
-                <a:latin typeface="+mn-lt"/>
-                <a:ea typeface="+mn-ea"/>
-                <a:cs typeface="+mn-cs"/>
-              </a:rPr>
-              <a:t>Daten:</a:t>
-            </a:r>
-          </a:p>
-          <a:p>
-            <a:r>
-              <a:rPr lang="de-CH" sz="1200" kern="1200" dirty="0">
-                <a:solidFill>
-                  <a:schemeClr val="tx1"/>
-                </a:solidFill>
-                <a:effectLst/>
-                <a:latin typeface="+mn-lt"/>
-                <a:ea typeface="+mn-ea"/>
-                <a:cs typeface="+mn-cs"/>
-              </a:rPr>
-              <a:t>Ein weiterer Wichtiger Punkt der bei der Konzeption beachtet wurde ist die Sicherung der Daten. Ein modernes Unternehmen muss dauernd auf alle Daten zugreifen können somit auch unser Kunde.  Bei einem Verlust ist es notwendig alle Daten wiederherstellen zu können. Der Datenschutz konnte geplant werden indem die Risiken beim Kunden analysiert wurden. Das können menschliche oder elementare Risiken sein zum Beispiel. Ebenfalls mussten die Vorgaben an die Datensicherung bekannt sein. Erst dann konnte ein Sicherungsplan erstellt werden welcher den Anforderungen des Kunden gerecht wurde.</a:t>
-            </a:r>
-          </a:p>
-          <a:p>
-            <a:r>
-              <a:rPr lang="de-CH" sz="1200" kern="1200" dirty="0" err="1">
-                <a:solidFill>
-                  <a:schemeClr val="tx1"/>
-                </a:solidFill>
-                <a:effectLst/>
-                <a:latin typeface="+mn-lt"/>
-                <a:ea typeface="+mn-ea"/>
-                <a:cs typeface="+mn-cs"/>
-              </a:rPr>
-              <a:t>Testing</a:t>
-            </a:r>
-            <a:r>
-              <a:rPr lang="de-CH" sz="1200" kern="1200" dirty="0">
-                <a:solidFill>
-                  <a:schemeClr val="tx1"/>
-                </a:solidFill>
-                <a:effectLst/>
-                <a:latin typeface="+mn-lt"/>
-                <a:ea typeface="+mn-ea"/>
-                <a:cs typeface="+mn-cs"/>
-              </a:rPr>
-              <a:t>:</a:t>
-            </a:r>
-          </a:p>
-          <a:p>
-            <a:r>
-              <a:rPr lang="de-CH" sz="1200" kern="1200" dirty="0">
-                <a:solidFill>
-                  <a:schemeClr val="tx1"/>
-                </a:solidFill>
-                <a:effectLst/>
-                <a:latin typeface="+mn-lt"/>
-                <a:ea typeface="+mn-ea"/>
-                <a:cs typeface="+mn-cs"/>
-              </a:rPr>
-              <a:t>Um das Endprodukt freigeben zu können müssen die Ergebnisse zuerst getestet werden. Dies wurde mit einem Testkonzept erledigt. Das Testkonzept enthält Informationen zur Testumgebung, sowie eine mögliche Testabfolge. Damit Testfälle erstellt werden konnten wurden auch die Voraussetzungen für jeweilige Tests abgeklärt. Ebenfalls auch die Anforderungen an das Netzwerk.</a:t>
-            </a:r>
-          </a:p>
-          <a:p>
-            <a:r>
-              <a:rPr lang="de-CH" sz="1200" kern="1200" dirty="0">
-                <a:solidFill>
-                  <a:schemeClr val="tx1"/>
-                </a:solidFill>
-                <a:effectLst/>
-                <a:latin typeface="+mn-lt"/>
-                <a:ea typeface="+mn-ea"/>
-                <a:cs typeface="+mn-cs"/>
-              </a:rPr>
-              <a:t> </a:t>
-            </a:r>
-          </a:p>
-          <a:p>
-            <a:r>
-              <a:rPr lang="de-CH" sz="1200" kern="1200" dirty="0">
-                <a:solidFill>
-                  <a:schemeClr val="tx1"/>
-                </a:solidFill>
-                <a:effectLst/>
-                <a:latin typeface="+mn-lt"/>
-                <a:ea typeface="+mn-ea"/>
-                <a:cs typeface="+mn-cs"/>
-              </a:rPr>
-              <a:t>Die Konzeption sprich Detailkonzeption ermöglicht es erst die Planungsphase abzuschliessen und zur Realisierungsphase fortzuschreiten.</a:t>
-            </a:r>
-          </a:p>
-          <a:p>
-            <a:r>
-              <a:rPr lang="de-CH" sz="1200" kern="1200" dirty="0">
-                <a:solidFill>
-                  <a:schemeClr val="tx1"/>
-                </a:solidFill>
-                <a:effectLst/>
-                <a:latin typeface="+mn-lt"/>
-                <a:ea typeface="+mn-ea"/>
-                <a:cs typeface="+mn-cs"/>
-              </a:rPr>
-              <a:t> </a:t>
-            </a:r>
-          </a:p>
-          <a:p>
-            <a:endParaRPr lang="de-CH" dirty="0"/>
           </a:p>
         </p:txBody>
       </p:sp>
@@ -1877,7 +1582,7 @@
           <a:p>
             <a:fld id="{E981EAC2-BEA1-4A38-870C-492542521EC7}" type="datetimeFigureOut">
               <a:rPr lang="de-CH" smtClean="0"/>
-              <a:t>01.06.2021</a:t>
+              <a:t>03.06.2021</a:t>
             </a:fld>
             <a:endParaRPr lang="de-CH"/>
           </a:p>
@@ -2077,7 +1782,7 @@
           <a:p>
             <a:fld id="{E981EAC2-BEA1-4A38-870C-492542521EC7}" type="datetimeFigureOut">
               <a:rPr lang="de-CH" smtClean="0"/>
-              <a:t>01.06.2021</a:t>
+              <a:t>03.06.2021</a:t>
             </a:fld>
             <a:endParaRPr lang="de-CH"/>
           </a:p>
@@ -2287,7 +1992,7 @@
           <a:p>
             <a:fld id="{E981EAC2-BEA1-4A38-870C-492542521EC7}" type="datetimeFigureOut">
               <a:rPr lang="de-CH" smtClean="0"/>
-              <a:t>01.06.2021</a:t>
+              <a:t>03.06.2021</a:t>
             </a:fld>
             <a:endParaRPr lang="de-CH"/>
           </a:p>
@@ -2487,7 +2192,7 @@
           <a:p>
             <a:fld id="{E981EAC2-BEA1-4A38-870C-492542521EC7}" type="datetimeFigureOut">
               <a:rPr lang="de-CH" smtClean="0"/>
-              <a:t>01.06.2021</a:t>
+              <a:t>03.06.2021</a:t>
             </a:fld>
             <a:endParaRPr lang="de-CH"/>
           </a:p>
@@ -2763,7 +2468,7 @@
           <a:p>
             <a:fld id="{E981EAC2-BEA1-4A38-870C-492542521EC7}" type="datetimeFigureOut">
               <a:rPr lang="de-CH" smtClean="0"/>
-              <a:t>01.06.2021</a:t>
+              <a:t>03.06.2021</a:t>
             </a:fld>
             <a:endParaRPr lang="de-CH"/>
           </a:p>
@@ -3031,7 +2736,7 @@
           <a:p>
             <a:fld id="{E981EAC2-BEA1-4A38-870C-492542521EC7}" type="datetimeFigureOut">
               <a:rPr lang="de-CH" smtClean="0"/>
-              <a:t>01.06.2021</a:t>
+              <a:t>03.06.2021</a:t>
             </a:fld>
             <a:endParaRPr lang="de-CH"/>
           </a:p>
@@ -3446,7 +3151,7 @@
           <a:p>
             <a:fld id="{E981EAC2-BEA1-4A38-870C-492542521EC7}" type="datetimeFigureOut">
               <a:rPr lang="de-CH" smtClean="0"/>
-              <a:t>01.06.2021</a:t>
+              <a:t>03.06.2021</a:t>
             </a:fld>
             <a:endParaRPr lang="de-CH"/>
           </a:p>
@@ -3588,7 +3293,7 @@
           <a:p>
             <a:fld id="{E981EAC2-BEA1-4A38-870C-492542521EC7}" type="datetimeFigureOut">
               <a:rPr lang="de-CH" smtClean="0"/>
-              <a:t>01.06.2021</a:t>
+              <a:t>03.06.2021</a:t>
             </a:fld>
             <a:endParaRPr lang="de-CH"/>
           </a:p>
@@ -3701,7 +3406,7 @@
           <a:p>
             <a:fld id="{E981EAC2-BEA1-4A38-870C-492542521EC7}" type="datetimeFigureOut">
               <a:rPr lang="de-CH" smtClean="0"/>
-              <a:t>01.06.2021</a:t>
+              <a:t>03.06.2021</a:t>
             </a:fld>
             <a:endParaRPr lang="de-CH"/>
           </a:p>
@@ -4014,7 +3719,7 @@
           <a:p>
             <a:fld id="{E981EAC2-BEA1-4A38-870C-492542521EC7}" type="datetimeFigureOut">
               <a:rPr lang="de-CH" smtClean="0"/>
-              <a:t>01.06.2021</a:t>
+              <a:t>03.06.2021</a:t>
             </a:fld>
             <a:endParaRPr lang="de-CH"/>
           </a:p>
@@ -4303,7 +4008,7 @@
           <a:p>
             <a:fld id="{E981EAC2-BEA1-4A38-870C-492542521EC7}" type="datetimeFigureOut">
               <a:rPr lang="de-CH" smtClean="0"/>
-              <a:t>01.06.2021</a:t>
+              <a:t>03.06.2021</a:t>
             </a:fld>
             <a:endParaRPr lang="de-CH"/>
           </a:p>
@@ -4546,7 +4251,7 @@
           <a:p>
             <a:fld id="{E981EAC2-BEA1-4A38-870C-492542521EC7}" type="datetimeFigureOut">
               <a:rPr lang="de-CH" smtClean="0"/>
-              <a:t>01.06.2021</a:t>
+              <a:t>03.06.2021</a:t>
             </a:fld>
             <a:endParaRPr lang="de-CH"/>
           </a:p>
@@ -9037,7 +8742,7 @@
           <a:p>
             <a:fld id="{4C3F2C8B-BFDB-4DB2-8412-CD9E36C07FE0}" type="datetime1">
               <a:rPr lang="en-GB" smtClean="0"/>
-              <a:t>01/06/2021</a:t>
+              <a:t>03/06/2021</a:t>
             </a:fld>
             <a:endParaRPr lang="de-CH"/>
           </a:p>
@@ -15085,7 +14790,7 @@
           <a:p>
             <a:fld id="{76FBC214-A102-40A2-9BF9-8892C6F5CF17}" type="datetime1">
               <a:rPr lang="en-GB" smtClean="0"/>
-              <a:t>01/06/2021</a:t>
+              <a:t>03/06/2021</a:t>
             </a:fld>
             <a:endParaRPr lang="de-CH"/>
           </a:p>
@@ -15162,8 +14867,8 @@
         </p:nvSpPr>
         <p:spPr>
           <a:xfrm>
-            <a:off x="914400" y="1681018"/>
-            <a:ext cx="2059709" cy="369332"/>
+            <a:off x="620652" y="1069601"/>
+            <a:ext cx="2005051" cy="1015663"/>
           </a:xfrm>
           <a:prstGeom prst="rect">
             <a:avLst/>
@@ -15177,94 +14882,198 @@
           <a:lstStyle/>
           <a:p>
             <a:r>
-              <a:rPr lang="de-CH" dirty="0"/>
-              <a:t>Old </a:t>
+              <a:rPr lang="de-CH" sz="1800" dirty="0">
+                <a:gradFill>
+                  <a:gsLst>
+                    <a:gs pos="2917">
+                      <a:srgbClr val="353535"/>
+                    </a:gs>
+                    <a:gs pos="30000">
+                      <a:srgbClr val="353535"/>
+                    </a:gs>
+                  </a:gsLst>
+                  <a:lin ang="5400000" scaled="0"/>
+                </a:gradFill>
+                <a:latin typeface="Roboto Medium" panose="02000000000000000000" pitchFamily="2" charset="0"/>
+                <a:ea typeface="Roboto Medium" panose="02000000000000000000" pitchFamily="2" charset="0"/>
+              </a:rPr>
+              <a:t>Data </a:t>
             </a:r>
             <a:r>
-              <a:rPr lang="de-CH" dirty="0" err="1"/>
-              <a:t>method</a:t>
+              <a:rPr lang="de-CH" sz="1800" dirty="0" err="1">
+                <a:gradFill>
+                  <a:gsLst>
+                    <a:gs pos="2917">
+                      <a:srgbClr val="353535"/>
+                    </a:gs>
+                    <a:gs pos="30000">
+                      <a:srgbClr val="353535"/>
+                    </a:gs>
+                  </a:gsLst>
+                  <a:lin ang="5400000" scaled="0"/>
+                </a:gradFill>
+                <a:latin typeface="Roboto Medium" panose="02000000000000000000" pitchFamily="2" charset="0"/>
+                <a:ea typeface="Roboto Medium" panose="02000000000000000000" pitchFamily="2" charset="0"/>
+              </a:rPr>
+              <a:t>input</a:t>
             </a:r>
-            <a:endParaRPr lang="de-CH" dirty="0"/>
+            <a:endParaRPr lang="de-CH" sz="1800" dirty="0">
+              <a:gradFill>
+                <a:gsLst>
+                  <a:gs pos="2917">
+                    <a:srgbClr val="353535"/>
+                  </a:gs>
+                  <a:gs pos="30000">
+                    <a:srgbClr val="353535"/>
+                  </a:gs>
+                </a:gsLst>
+                <a:lin ang="5400000" scaled="0"/>
+              </a:gradFill>
+              <a:latin typeface="Roboto Medium" panose="02000000000000000000" pitchFamily="2" charset="0"/>
+              <a:ea typeface="Roboto Medium" panose="02000000000000000000" pitchFamily="2" charset="0"/>
+            </a:endParaRPr>
           </a:p>
-        </p:txBody>
-      </p:sp>
-      <p:sp>
-        <p:nvSpPr>
-          <p:cNvPr id="23" name="TextBox 22">
-            <a:extLst>
-              <a:ext uri="{FF2B5EF4-FFF2-40B4-BE49-F238E27FC236}">
-                <a16:creationId xmlns:a16="http://schemas.microsoft.com/office/drawing/2014/main" id="{77105282-8ECE-4D08-A255-D412943EF930}"/>
-              </a:ext>
-            </a:extLst>
-          </p:cNvPr>
-          <p:cNvSpPr txBox="1"/>
-          <p:nvPr/>
-        </p:nvSpPr>
-        <p:spPr>
-          <a:xfrm>
-            <a:off x="3392854" y="1681018"/>
-            <a:ext cx="2059709" cy="369332"/>
-          </a:xfrm>
-          <a:prstGeom prst="rect">
-            <a:avLst/>
-          </a:prstGeom>
-          <a:noFill/>
-        </p:spPr>
-        <p:txBody>
-          <a:bodyPr wrap="square" rtlCol="0">
-            <a:spAutoFit/>
-          </a:bodyPr>
-          <a:lstStyle/>
           <a:p>
+            <a:pPr marL="285750" indent="-285750">
+              <a:buFontTx/>
+              <a:buChar char="-"/>
+            </a:pPr>
             <a:r>
-              <a:rPr lang="de-CH" dirty="0"/>
-              <a:t>Old </a:t>
+              <a:rPr lang="de-CH" sz="1400" dirty="0">
+                <a:gradFill>
+                  <a:gsLst>
+                    <a:gs pos="2917">
+                      <a:srgbClr val="353535"/>
+                    </a:gs>
+                    <a:gs pos="30000">
+                      <a:srgbClr val="353535"/>
+                    </a:gs>
+                  </a:gsLst>
+                  <a:lin ang="5400000" scaled="0"/>
+                </a:gradFill>
+                <a:latin typeface="Roboto Medium" panose="02000000000000000000" pitchFamily="2" charset="0"/>
+                <a:ea typeface="Roboto Medium" panose="02000000000000000000" pitchFamily="2" charset="0"/>
+              </a:rPr>
+              <a:t>Location </a:t>
             </a:r>
             <a:r>
-              <a:rPr lang="de-CH" dirty="0" err="1"/>
-              <a:t>method</a:t>
-            </a:r>
-            <a:endParaRPr lang="de-CH" dirty="0"/>
-          </a:p>
-        </p:txBody>
-      </p:sp>
-      <p:sp>
-        <p:nvSpPr>
-          <p:cNvPr id="24" name="TextBox 23">
-            <a:extLst>
-              <a:ext uri="{FF2B5EF4-FFF2-40B4-BE49-F238E27FC236}">
-                <a16:creationId xmlns:a16="http://schemas.microsoft.com/office/drawing/2014/main" id="{2AF84061-E813-400F-B009-65F8EF59F6D6}"/>
-              </a:ext>
-            </a:extLst>
-          </p:cNvPr>
-          <p:cNvSpPr txBox="1"/>
-          <p:nvPr/>
-        </p:nvSpPr>
-        <p:spPr>
-          <a:xfrm>
-            <a:off x="5687659" y="1681018"/>
-            <a:ext cx="2059709" cy="369332"/>
-          </a:xfrm>
-          <a:prstGeom prst="rect">
-            <a:avLst/>
-          </a:prstGeom>
-          <a:noFill/>
-        </p:spPr>
-        <p:txBody>
-          <a:bodyPr wrap="square" rtlCol="0">
-            <a:spAutoFit/>
-          </a:bodyPr>
-          <a:lstStyle/>
-          <a:p>
-            <a:r>
-              <a:rPr lang="de-CH" dirty="0"/>
-              <a:t>Old </a:t>
+              <a:rPr lang="de-CH" sz="1400" dirty="0" err="1">
+                <a:gradFill>
+                  <a:gsLst>
+                    <a:gs pos="2917">
+                      <a:srgbClr val="353535"/>
+                    </a:gs>
+                    <a:gs pos="30000">
+                      <a:srgbClr val="353535"/>
+                    </a:gs>
+                  </a:gsLst>
+                  <a:lin ang="5400000" scaled="0"/>
+                </a:gradFill>
+                <a:latin typeface="Roboto Medium" panose="02000000000000000000" pitchFamily="2" charset="0"/>
+                <a:ea typeface="Roboto Medium" panose="02000000000000000000" pitchFamily="2" charset="0"/>
+              </a:rPr>
+              <a:t>of</a:t>
             </a:r>
             <a:r>
-              <a:rPr lang="de-CH" dirty="0" err="1"/>
-              <a:t>method</a:t>
+              <a:rPr lang="de-CH" sz="1400" dirty="0">
+                <a:gradFill>
+                  <a:gsLst>
+                    <a:gs pos="2917">
+                      <a:srgbClr val="353535"/>
+                    </a:gs>
+                    <a:gs pos="30000">
+                      <a:srgbClr val="353535"/>
+                    </a:gs>
+                  </a:gsLst>
+                  <a:lin ang="5400000" scaled="0"/>
+                </a:gradFill>
+                <a:latin typeface="Roboto Medium" panose="02000000000000000000" pitchFamily="2" charset="0"/>
+                <a:ea typeface="Roboto Medium" panose="02000000000000000000" pitchFamily="2" charset="0"/>
+              </a:rPr>
+              <a:t> </a:t>
             </a:r>
-            <a:endParaRPr lang="de-CH" dirty="0"/>
+            <a:r>
+              <a:rPr lang="de-CH" sz="1400" dirty="0" err="1">
+                <a:gradFill>
+                  <a:gsLst>
+                    <a:gs pos="2917">
+                      <a:srgbClr val="353535"/>
+                    </a:gs>
+                    <a:gs pos="30000">
+                      <a:srgbClr val="353535"/>
+                    </a:gs>
+                  </a:gsLst>
+                  <a:lin ang="5400000" scaled="0"/>
+                </a:gradFill>
+                <a:latin typeface="Roboto Medium" panose="02000000000000000000" pitchFamily="2" charset="0"/>
+                <a:ea typeface="Roboto Medium" panose="02000000000000000000" pitchFamily="2" charset="0"/>
+              </a:rPr>
+              <a:t>file</a:t>
+            </a:r>
+            <a:endParaRPr lang="de-CH" sz="1400" dirty="0">
+              <a:gradFill>
+                <a:gsLst>
+                  <a:gs pos="2917">
+                    <a:srgbClr val="353535"/>
+                  </a:gs>
+                  <a:gs pos="30000">
+                    <a:srgbClr val="353535"/>
+                  </a:gs>
+                </a:gsLst>
+                <a:lin ang="5400000" scaled="0"/>
+              </a:gradFill>
+              <a:latin typeface="Roboto Medium" panose="02000000000000000000" pitchFamily="2" charset="0"/>
+              <a:ea typeface="Roboto Medium" panose="02000000000000000000" pitchFamily="2" charset="0"/>
+            </a:endParaRPr>
+          </a:p>
+          <a:p>
+            <a:pPr marL="285750" indent="-285750">
+              <a:buFontTx/>
+              <a:buChar char="-"/>
+            </a:pPr>
+            <a:r>
+              <a:rPr lang="de-CH" sz="1400" dirty="0">
+                <a:gradFill>
+                  <a:gsLst>
+                    <a:gs pos="2917">
+                      <a:srgbClr val="353535"/>
+                    </a:gs>
+                    <a:gs pos="30000">
+                      <a:srgbClr val="353535"/>
+                    </a:gs>
+                  </a:gsLst>
+                  <a:lin ang="5400000" scaled="0"/>
+                </a:gradFill>
+                <a:latin typeface="Roboto Medium" panose="02000000000000000000" pitchFamily="2" charset="0"/>
+                <a:ea typeface="Roboto Medium" panose="02000000000000000000" pitchFamily="2" charset="0"/>
+              </a:rPr>
+              <a:t>Extension type</a:t>
+            </a:r>
+          </a:p>
+          <a:p>
+            <a:pPr marL="285750" indent="-285750">
+              <a:buFontTx/>
+              <a:buChar char="-"/>
+            </a:pPr>
+            <a:r>
+              <a:rPr lang="de-CH" sz="1400" dirty="0">
+                <a:gradFill>
+                  <a:gsLst>
+                    <a:gs pos="2917">
+                      <a:srgbClr val="353535"/>
+                    </a:gs>
+                    <a:gs pos="30000">
+                      <a:srgbClr val="353535"/>
+                    </a:gs>
+                  </a:gsLst>
+                  <a:lin ang="5400000" scaled="0"/>
+                </a:gradFill>
+                <a:latin typeface="Roboto Medium" panose="02000000000000000000" pitchFamily="2" charset="0"/>
+                <a:ea typeface="Roboto Medium" panose="02000000000000000000" pitchFamily="2" charset="0"/>
+              </a:rPr>
+              <a:t>Return</a:t>
+            </a:r>
+            <a:endParaRPr lang="de-CH" sz="1400" dirty="0"/>
           </a:p>
         </p:txBody>
       </p:sp>
@@ -15282,8 +15091,8 @@
         </p:nvSpPr>
         <p:spPr>
           <a:xfrm>
-            <a:off x="715057" y="3456586"/>
-            <a:ext cx="2059709" cy="369332"/>
+            <a:off x="731193" y="4496514"/>
+            <a:ext cx="4745971" cy="800219"/>
           </a:xfrm>
           <a:prstGeom prst="rect">
             <a:avLst/>
@@ -15297,113 +15106,479 @@
           <a:lstStyle/>
           <a:p>
             <a:r>
-              <a:rPr lang="de-CH" dirty="0"/>
-              <a:t>New </a:t>
+              <a:rPr lang="de-CH" dirty="0">
+                <a:gradFill>
+                  <a:gsLst>
+                    <a:gs pos="2917">
+                      <a:srgbClr val="353535"/>
+                    </a:gs>
+                    <a:gs pos="30000">
+                      <a:srgbClr val="353535"/>
+                    </a:gs>
+                  </a:gsLst>
+                  <a:lin ang="5400000" scaled="0"/>
+                </a:gradFill>
+                <a:latin typeface="Roboto Medium" panose="02000000000000000000" pitchFamily="2" charset="0"/>
+                <a:ea typeface="Roboto Medium" panose="02000000000000000000" pitchFamily="2" charset="0"/>
+              </a:rPr>
+              <a:t>Package «</a:t>
             </a:r>
             <a:r>
-              <a:rPr lang="de-CH" dirty="0" err="1"/>
-              <a:t>method</a:t>
-            </a:r>
-            <a:endParaRPr lang="de-CH" dirty="0"/>
-          </a:p>
-        </p:txBody>
-      </p:sp>
-      <p:sp>
-        <p:nvSpPr>
-          <p:cNvPr id="26" name="TextBox 25">
-            <a:extLst>
-              <a:ext uri="{FF2B5EF4-FFF2-40B4-BE49-F238E27FC236}">
-                <a16:creationId xmlns:a16="http://schemas.microsoft.com/office/drawing/2014/main" id="{CC93FC9E-62FA-4EB5-B1CA-3F1F692EE671}"/>
-              </a:ext>
-            </a:extLst>
-          </p:cNvPr>
-          <p:cNvSpPr txBox="1"/>
-          <p:nvPr/>
-        </p:nvSpPr>
-        <p:spPr>
-          <a:xfrm>
-            <a:off x="3335899" y="3088988"/>
-            <a:ext cx="2059709" cy="646331"/>
-          </a:xfrm>
-          <a:prstGeom prst="rect">
-            <a:avLst/>
-          </a:prstGeom>
-          <a:noFill/>
-        </p:spPr>
-        <p:txBody>
-          <a:bodyPr wrap="square" rtlCol="0">
-            <a:spAutoFit/>
-          </a:bodyPr>
-          <a:lstStyle/>
-          <a:p>
-            <a:r>
-              <a:rPr lang="de-CH" dirty="0"/>
-              <a:t>New </a:t>
+              <a:rPr lang="de-CH" dirty="0" err="1">
+                <a:gradFill>
+                  <a:gsLst>
+                    <a:gs pos="2917">
+                      <a:srgbClr val="353535"/>
+                    </a:gs>
+                    <a:gs pos="30000">
+                      <a:srgbClr val="353535"/>
+                    </a:gs>
+                  </a:gsLst>
+                  <a:lin ang="5400000" scaled="0"/>
+                </a:gradFill>
+                <a:latin typeface="Roboto Medium" panose="02000000000000000000" pitchFamily="2" charset="0"/>
+                <a:ea typeface="Roboto Medium" panose="02000000000000000000" pitchFamily="2" charset="0"/>
+              </a:rPr>
+              <a:t>as</a:t>
             </a:r>
             <a:r>
-              <a:rPr lang="de-CH" dirty="0" err="1"/>
-              <a:t>method</a:t>
+              <a:rPr lang="de-CH" dirty="0">
+                <a:gradFill>
+                  <a:gsLst>
+                    <a:gs pos="2917">
+                      <a:srgbClr val="353535"/>
+                    </a:gs>
+                    <a:gs pos="30000">
+                      <a:srgbClr val="353535"/>
+                    </a:gs>
+                  </a:gsLst>
+                  <a:lin ang="5400000" scaled="0"/>
+                </a:gradFill>
+                <a:latin typeface="Roboto Medium" panose="02000000000000000000" pitchFamily="2" charset="0"/>
+                <a:ea typeface="Roboto Medium" panose="02000000000000000000" pitchFamily="2" charset="0"/>
+              </a:rPr>
+              <a:t> </a:t>
             </a:r>
             <a:r>
-              <a:rPr lang="de-CH" dirty="0"/>
-              <a:t> (</a:t>
+              <a:rPr lang="de-CH" dirty="0" err="1">
+                <a:gradFill>
+                  <a:gsLst>
+                    <a:gs pos="2917">
+                      <a:srgbClr val="353535"/>
+                    </a:gs>
+                    <a:gs pos="30000">
+                      <a:srgbClr val="353535"/>
+                    </a:gs>
+                  </a:gsLst>
+                  <a:lin ang="5400000" scaled="0"/>
+                </a:gradFill>
+                <a:latin typeface="Roboto Medium" panose="02000000000000000000" pitchFamily="2" charset="0"/>
+                <a:ea typeface="Roboto Medium" panose="02000000000000000000" pitchFamily="2" charset="0"/>
+              </a:rPr>
+              <a:t>is</a:t>
             </a:r>
             <a:r>
-              <a:rPr lang="de-CH" dirty="0" err="1"/>
+              <a:rPr lang="de-CH" dirty="0">
+                <a:gradFill>
+                  <a:gsLst>
+                    <a:gs pos="2917">
+                      <a:srgbClr val="353535"/>
+                    </a:gs>
+                    <a:gs pos="30000">
+                      <a:srgbClr val="353535"/>
+                    </a:gs>
+                  </a:gsLst>
+                  <a:lin ang="5400000" scaled="0"/>
+                </a:gradFill>
+                <a:latin typeface="Roboto Medium" panose="02000000000000000000" pitchFamily="2" charset="0"/>
+                <a:ea typeface="Roboto Medium" panose="02000000000000000000" pitchFamily="2" charset="0"/>
+              </a:rPr>
+              <a:t>»</a:t>
+            </a:r>
+          </a:p>
+          <a:p>
+            <a:pPr marL="285750" indent="-285750">
+              <a:buFontTx/>
+              <a:buChar char="-"/>
+            </a:pPr>
+            <a:r>
+              <a:rPr lang="de-CH" sz="1400" dirty="0">
+                <a:gradFill>
+                  <a:gsLst>
+                    <a:gs pos="2917">
+                      <a:srgbClr val="353535"/>
+                    </a:gs>
+                    <a:gs pos="30000">
+                      <a:srgbClr val="353535"/>
+                    </a:gs>
+                  </a:gsLst>
+                  <a:lin ang="5400000" scaled="0"/>
+                </a:gradFill>
+                <a:latin typeface="Roboto Medium" panose="02000000000000000000" pitchFamily="2" charset="0"/>
+                <a:ea typeface="Roboto Medium" panose="02000000000000000000" pitchFamily="2" charset="0"/>
+              </a:rPr>
+              <a:t>Single </a:t>
+            </a:r>
+            <a:r>
+              <a:rPr lang="de-CH" sz="1400" dirty="0" err="1">
+                <a:gradFill>
+                  <a:gsLst>
+                    <a:gs pos="2917">
+                      <a:srgbClr val="353535"/>
+                    </a:gs>
+                    <a:gs pos="30000">
+                      <a:srgbClr val="353535"/>
+                    </a:gs>
+                  </a:gsLst>
+                  <a:lin ang="5400000" scaled="0"/>
+                </a:gradFill>
+                <a:latin typeface="Roboto Medium" panose="02000000000000000000" pitchFamily="2" charset="0"/>
+                <a:ea typeface="Roboto Medium" panose="02000000000000000000" pitchFamily="2" charset="0"/>
+              </a:rPr>
               <a:t>function</a:t>
             </a:r>
             <a:r>
-              <a:rPr lang="de-CH" dirty="0"/>
+              <a:rPr lang="de-CH" sz="1400" dirty="0">
+                <a:gradFill>
+                  <a:gsLst>
+                    <a:gs pos="2917">
+                      <a:srgbClr val="353535"/>
+                    </a:gs>
+                    <a:gs pos="30000">
+                      <a:srgbClr val="353535"/>
+                    </a:gs>
+                  </a:gsLst>
+                  <a:lin ang="5400000" scaled="0"/>
+                </a:gradFill>
+                <a:latin typeface="Roboto Medium" panose="02000000000000000000" pitchFamily="2" charset="0"/>
+                <a:ea typeface="Roboto Medium" panose="02000000000000000000" pitchFamily="2" charset="0"/>
+              </a:rPr>
+              <a:t>, </a:t>
+            </a:r>
+            <a:r>
+              <a:rPr lang="de-CH" sz="1400" dirty="0" err="1">
+                <a:gradFill>
+                  <a:gsLst>
+                    <a:gs pos="2917">
+                      <a:srgbClr val="353535"/>
+                    </a:gs>
+                    <a:gs pos="30000">
+                      <a:srgbClr val="353535"/>
+                    </a:gs>
+                  </a:gsLst>
+                  <a:lin ang="5400000" scaled="0"/>
+                </a:gradFill>
+                <a:latin typeface="Roboto Medium" panose="02000000000000000000" pitchFamily="2" charset="0"/>
+                <a:ea typeface="Roboto Medium" panose="02000000000000000000" pitchFamily="2" charset="0"/>
+              </a:rPr>
+              <a:t>tweakable</a:t>
+            </a:r>
+            <a:r>
+              <a:rPr lang="de-CH" sz="1400" dirty="0">
+                <a:gradFill>
+                  <a:gsLst>
+                    <a:gs pos="2917">
+                      <a:srgbClr val="353535"/>
+                    </a:gs>
+                    <a:gs pos="30000">
+                      <a:srgbClr val="353535"/>
+                    </a:gs>
+                  </a:gsLst>
+                  <a:lin ang="5400000" scaled="0"/>
+                </a:gradFill>
+                <a:latin typeface="Roboto Medium" panose="02000000000000000000" pitchFamily="2" charset="0"/>
+                <a:ea typeface="Roboto Medium" panose="02000000000000000000" pitchFamily="2" charset="0"/>
+              </a:rPr>
               <a:t> </a:t>
             </a:r>
             <a:r>
-              <a:rPr lang="de-CH" dirty="0" err="1"/>
-              <a:t>tuning</a:t>
+              <a:rPr lang="de-CH" sz="1400" dirty="0" err="1">
+                <a:gradFill>
+                  <a:gsLst>
+                    <a:gs pos="2917">
+                      <a:srgbClr val="353535"/>
+                    </a:gs>
+                    <a:gs pos="30000">
+                      <a:srgbClr val="353535"/>
+                    </a:gs>
+                  </a:gsLst>
+                  <a:lin ang="5400000" scaled="0"/>
+                </a:gradFill>
+                <a:latin typeface="Roboto Medium" panose="02000000000000000000" pitchFamily="2" charset="0"/>
+                <a:ea typeface="Roboto Medium" panose="02000000000000000000" pitchFamily="2" charset="0"/>
+              </a:rPr>
+              <a:t>elements</a:t>
+            </a:r>
+            <a:endParaRPr lang="de-CH" sz="1400" dirty="0">
+              <a:gradFill>
+                <a:gsLst>
+                  <a:gs pos="2917">
+                    <a:srgbClr val="353535"/>
+                  </a:gs>
+                  <a:gs pos="30000">
+                    <a:srgbClr val="353535"/>
+                  </a:gs>
+                </a:gsLst>
+                <a:lin ang="5400000" scaled="0"/>
+              </a:gradFill>
+              <a:latin typeface="Roboto Medium" panose="02000000000000000000" pitchFamily="2" charset="0"/>
+              <a:ea typeface="Roboto Medium" panose="02000000000000000000" pitchFamily="2" charset="0"/>
+            </a:endParaRPr>
+          </a:p>
+          <a:p>
+            <a:pPr marL="285750" indent="-285750">
+              <a:buFontTx/>
+              <a:buChar char="-"/>
+            </a:pPr>
+            <a:r>
+              <a:rPr lang="de-CH" sz="1400" dirty="0" err="1">
+                <a:gradFill>
+                  <a:gsLst>
+                    <a:gs pos="2917">
+                      <a:srgbClr val="353535"/>
+                    </a:gs>
+                    <a:gs pos="30000">
+                      <a:srgbClr val="353535"/>
+                    </a:gs>
+                  </a:gsLst>
+                  <a:lin ang="5400000" scaled="0"/>
+                </a:gradFill>
+                <a:latin typeface="Roboto Medium" panose="02000000000000000000" pitchFamily="2" charset="0"/>
+                <a:ea typeface="Roboto Medium" panose="02000000000000000000" pitchFamily="2" charset="0"/>
+              </a:rPr>
+              <a:t>Possibility</a:t>
             </a:r>
             <a:r>
-              <a:rPr lang="de-CH" dirty="0"/>
-              <a:t>)</a:t>
-            </a:r>
-          </a:p>
-        </p:txBody>
-      </p:sp>
-      <p:sp>
-        <p:nvSpPr>
-          <p:cNvPr id="27" name="TextBox 26">
-            <a:extLst>
-              <a:ext uri="{FF2B5EF4-FFF2-40B4-BE49-F238E27FC236}">
-                <a16:creationId xmlns:a16="http://schemas.microsoft.com/office/drawing/2014/main" id="{D7D25702-0614-4C1F-8CF0-E4EE301E238A}"/>
-              </a:ext>
-            </a:extLst>
-          </p:cNvPr>
-          <p:cNvSpPr txBox="1"/>
-          <p:nvPr/>
-        </p:nvSpPr>
-        <p:spPr>
-          <a:xfrm>
-            <a:off x="3335902" y="4391148"/>
-            <a:ext cx="2059709" cy="369332"/>
-          </a:xfrm>
-          <a:prstGeom prst="rect">
-            <a:avLst/>
-          </a:prstGeom>
-          <a:noFill/>
-        </p:spPr>
-        <p:txBody>
-          <a:bodyPr wrap="square" rtlCol="0">
-            <a:spAutoFit/>
-          </a:bodyPr>
-          <a:lstStyle/>
-          <a:p>
-            <a:r>
-              <a:rPr lang="de-CH" dirty="0"/>
-              <a:t>New </a:t>
+              <a:rPr lang="de-CH" sz="1400" dirty="0">
+                <a:gradFill>
+                  <a:gsLst>
+                    <a:gs pos="2917">
+                      <a:srgbClr val="353535"/>
+                    </a:gs>
+                    <a:gs pos="30000">
+                      <a:srgbClr val="353535"/>
+                    </a:gs>
+                  </a:gsLst>
+                  <a:lin ang="5400000" scaled="0"/>
+                </a:gradFill>
+                <a:latin typeface="Roboto Medium" panose="02000000000000000000" pitchFamily="2" charset="0"/>
+                <a:ea typeface="Roboto Medium" panose="02000000000000000000" pitchFamily="2" charset="0"/>
+              </a:rPr>
+              <a:t> </a:t>
             </a:r>
             <a:r>
-              <a:rPr lang="de-CH" dirty="0" err="1"/>
-              <a:t>method</a:t>
+              <a:rPr lang="de-CH" sz="1400" dirty="0" err="1">
+                <a:gradFill>
+                  <a:gsLst>
+                    <a:gs pos="2917">
+                      <a:srgbClr val="353535"/>
+                    </a:gs>
+                    <a:gs pos="30000">
+                      <a:srgbClr val="353535"/>
+                    </a:gs>
+                  </a:gsLst>
+                  <a:lin ang="5400000" scaled="0"/>
+                </a:gradFill>
+                <a:latin typeface="Roboto Medium" panose="02000000000000000000" pitchFamily="2" charset="0"/>
+                <a:ea typeface="Roboto Medium" panose="02000000000000000000" pitchFamily="2" charset="0"/>
+              </a:rPr>
+              <a:t>to</a:t>
             </a:r>
-            <a:endParaRPr lang="de-CH" dirty="0"/>
+            <a:r>
+              <a:rPr lang="de-CH" sz="1400" dirty="0">
+                <a:gradFill>
+                  <a:gsLst>
+                    <a:gs pos="2917">
+                      <a:srgbClr val="353535"/>
+                    </a:gs>
+                    <a:gs pos="30000">
+                      <a:srgbClr val="353535"/>
+                    </a:gs>
+                  </a:gsLst>
+                  <a:lin ang="5400000" scaled="0"/>
+                </a:gradFill>
+                <a:latin typeface="Roboto Medium" panose="02000000000000000000" pitchFamily="2" charset="0"/>
+                <a:ea typeface="Roboto Medium" panose="02000000000000000000" pitchFamily="2" charset="0"/>
+              </a:rPr>
+              <a:t> </a:t>
+            </a:r>
+            <a:r>
+              <a:rPr lang="de-CH" sz="1400" dirty="0" err="1">
+                <a:gradFill>
+                  <a:gsLst>
+                    <a:gs pos="2917">
+                      <a:srgbClr val="353535"/>
+                    </a:gs>
+                    <a:gs pos="30000">
+                      <a:srgbClr val="353535"/>
+                    </a:gs>
+                  </a:gsLst>
+                  <a:lin ang="5400000" scaled="0"/>
+                </a:gradFill>
+                <a:latin typeface="Roboto Medium" panose="02000000000000000000" pitchFamily="2" charset="0"/>
+                <a:ea typeface="Roboto Medium" panose="02000000000000000000" pitchFamily="2" charset="0"/>
+              </a:rPr>
+              <a:t>use</a:t>
+            </a:r>
+            <a:r>
+              <a:rPr lang="de-CH" sz="1400" dirty="0">
+                <a:gradFill>
+                  <a:gsLst>
+                    <a:gs pos="2917">
+                      <a:srgbClr val="353535"/>
+                    </a:gs>
+                    <a:gs pos="30000">
+                      <a:srgbClr val="353535"/>
+                    </a:gs>
+                  </a:gsLst>
+                  <a:lin ang="5400000" scaled="0"/>
+                </a:gradFill>
+                <a:latin typeface="Roboto Medium" panose="02000000000000000000" pitchFamily="2" charset="0"/>
+                <a:ea typeface="Roboto Medium" panose="02000000000000000000" pitchFamily="2" charset="0"/>
+              </a:rPr>
+              <a:t> </a:t>
+            </a:r>
+            <a:r>
+              <a:rPr lang="de-CH" sz="1400" dirty="0" err="1">
+                <a:gradFill>
+                  <a:gsLst>
+                    <a:gs pos="2917">
+                      <a:srgbClr val="353535"/>
+                    </a:gs>
+                    <a:gs pos="30000">
+                      <a:srgbClr val="353535"/>
+                    </a:gs>
+                  </a:gsLst>
+                  <a:lin ang="5400000" scaled="0"/>
+                </a:gradFill>
+                <a:latin typeface="Roboto Medium" panose="02000000000000000000" pitchFamily="2" charset="0"/>
+                <a:ea typeface="Roboto Medium" panose="02000000000000000000" pitchFamily="2" charset="0"/>
+              </a:rPr>
+              <a:t>step</a:t>
+            </a:r>
+            <a:r>
+              <a:rPr lang="de-CH" sz="1400" dirty="0">
+                <a:gradFill>
+                  <a:gsLst>
+                    <a:gs pos="2917">
+                      <a:srgbClr val="353535"/>
+                    </a:gs>
+                    <a:gs pos="30000">
+                      <a:srgbClr val="353535"/>
+                    </a:gs>
+                  </a:gsLst>
+                  <a:lin ang="5400000" scaled="0"/>
+                </a:gradFill>
+                <a:latin typeface="Roboto Medium" panose="02000000000000000000" pitchFamily="2" charset="0"/>
+                <a:ea typeface="Roboto Medium" panose="02000000000000000000" pitchFamily="2" charset="0"/>
+              </a:rPr>
+              <a:t> </a:t>
+            </a:r>
+            <a:r>
+              <a:rPr lang="de-CH" sz="1400" dirty="0" err="1">
+                <a:gradFill>
+                  <a:gsLst>
+                    <a:gs pos="2917">
+                      <a:srgbClr val="353535"/>
+                    </a:gs>
+                    <a:gs pos="30000">
+                      <a:srgbClr val="353535"/>
+                    </a:gs>
+                  </a:gsLst>
+                  <a:lin ang="5400000" scaled="0"/>
+                </a:gradFill>
+                <a:latin typeface="Roboto Medium" panose="02000000000000000000" pitchFamily="2" charset="0"/>
+                <a:ea typeface="Roboto Medium" panose="02000000000000000000" pitchFamily="2" charset="0"/>
+              </a:rPr>
+              <a:t>by</a:t>
+            </a:r>
+            <a:r>
+              <a:rPr lang="de-CH" sz="1400" dirty="0">
+                <a:gradFill>
+                  <a:gsLst>
+                    <a:gs pos="2917">
+                      <a:srgbClr val="353535"/>
+                    </a:gs>
+                    <a:gs pos="30000">
+                      <a:srgbClr val="353535"/>
+                    </a:gs>
+                  </a:gsLst>
+                  <a:lin ang="5400000" scaled="0"/>
+                </a:gradFill>
+                <a:latin typeface="Roboto Medium" panose="02000000000000000000" pitchFamily="2" charset="0"/>
+                <a:ea typeface="Roboto Medium" panose="02000000000000000000" pitchFamily="2" charset="0"/>
+              </a:rPr>
+              <a:t> </a:t>
+            </a:r>
+            <a:r>
+              <a:rPr lang="de-CH" sz="1400" dirty="0" err="1">
+                <a:gradFill>
+                  <a:gsLst>
+                    <a:gs pos="2917">
+                      <a:srgbClr val="353535"/>
+                    </a:gs>
+                    <a:gs pos="30000">
+                      <a:srgbClr val="353535"/>
+                    </a:gs>
+                  </a:gsLst>
+                  <a:lin ang="5400000" scaled="0"/>
+                </a:gradFill>
+                <a:latin typeface="Roboto Medium" panose="02000000000000000000" pitchFamily="2" charset="0"/>
+                <a:ea typeface="Roboto Medium" panose="02000000000000000000" pitchFamily="2" charset="0"/>
+              </a:rPr>
+              <a:t>step</a:t>
+            </a:r>
+            <a:r>
+              <a:rPr lang="de-CH" sz="1400" dirty="0">
+                <a:gradFill>
+                  <a:gsLst>
+                    <a:gs pos="2917">
+                      <a:srgbClr val="353535"/>
+                    </a:gs>
+                    <a:gs pos="30000">
+                      <a:srgbClr val="353535"/>
+                    </a:gs>
+                  </a:gsLst>
+                  <a:lin ang="5400000" scaled="0"/>
+                </a:gradFill>
+                <a:latin typeface="Roboto Medium" panose="02000000000000000000" pitchFamily="2" charset="0"/>
+                <a:ea typeface="Roboto Medium" panose="02000000000000000000" pitchFamily="2" charset="0"/>
+              </a:rPr>
+              <a:t> </a:t>
+            </a:r>
+            <a:r>
+              <a:rPr lang="de-CH" sz="1400" dirty="0" err="1">
+                <a:gradFill>
+                  <a:gsLst>
+                    <a:gs pos="2917">
+                      <a:srgbClr val="353535"/>
+                    </a:gs>
+                    <a:gs pos="30000">
+                      <a:srgbClr val="353535"/>
+                    </a:gs>
+                  </a:gsLst>
+                  <a:lin ang="5400000" scaled="0"/>
+                </a:gradFill>
+                <a:latin typeface="Roboto Medium" panose="02000000000000000000" pitchFamily="2" charset="0"/>
+                <a:ea typeface="Roboto Medium" panose="02000000000000000000" pitchFamily="2" charset="0"/>
+              </a:rPr>
+              <a:t>approach</a:t>
+            </a:r>
+            <a:endParaRPr lang="de-CH" sz="1400" dirty="0">
+              <a:gradFill>
+                <a:gsLst>
+                  <a:gs pos="2917">
+                    <a:srgbClr val="353535"/>
+                  </a:gs>
+                  <a:gs pos="30000">
+                    <a:srgbClr val="353535"/>
+                  </a:gs>
+                </a:gsLst>
+                <a:lin ang="5400000" scaled="0"/>
+              </a:gradFill>
+              <a:latin typeface="Roboto Medium" panose="02000000000000000000" pitchFamily="2" charset="0"/>
+              <a:ea typeface="Roboto Medium" panose="02000000000000000000" pitchFamily="2" charset="0"/>
+            </a:endParaRPr>
           </a:p>
         </p:txBody>
       </p:sp>
@@ -15421,7 +15596,7 @@
         </p:nvSpPr>
         <p:spPr>
           <a:xfrm>
-            <a:off x="7326012" y="3566846"/>
+            <a:off x="9404879" y="4576347"/>
             <a:ext cx="2059709" cy="646331"/>
           </a:xfrm>
           <a:prstGeom prst="rect">
@@ -15436,35 +15611,119 @@
           <a:lstStyle/>
           <a:p>
             <a:r>
-              <a:rPr lang="de-CH" dirty="0" err="1"/>
+              <a:rPr lang="de-CH" b="1" u="sng" dirty="0" err="1">
+                <a:gradFill>
+                  <a:gsLst>
+                    <a:gs pos="2917">
+                      <a:srgbClr val="353535"/>
+                    </a:gs>
+                    <a:gs pos="30000">
+                      <a:srgbClr val="353535"/>
+                    </a:gs>
+                  </a:gsLst>
+                  <a:lin ang="5400000" scaled="0"/>
+                </a:gradFill>
+                <a:latin typeface="Roboto Medium" panose="02000000000000000000" pitchFamily="2" charset="0"/>
+                <a:ea typeface="Roboto Medium" panose="02000000000000000000" pitchFamily="2" charset="0"/>
+              </a:rPr>
               <a:t>Result</a:t>
             </a:r>
             <a:r>
-              <a:rPr lang="de-CH" dirty="0"/>
+              <a:rPr lang="de-CH" b="1" u="sng" dirty="0">
+                <a:gradFill>
+                  <a:gsLst>
+                    <a:gs pos="2917">
+                      <a:srgbClr val="353535"/>
+                    </a:gs>
+                    <a:gs pos="30000">
+                      <a:srgbClr val="353535"/>
+                    </a:gs>
+                  </a:gsLst>
+                  <a:lin ang="5400000" scaled="0"/>
+                </a:gradFill>
+                <a:latin typeface="Roboto Medium" panose="02000000000000000000" pitchFamily="2" charset="0"/>
+                <a:ea typeface="Roboto Medium" panose="02000000000000000000" pitchFamily="2" charset="0"/>
+              </a:rPr>
               <a:t> </a:t>
             </a:r>
             <a:r>
-              <a:rPr lang="de-CH" dirty="0" err="1"/>
+              <a:rPr lang="de-CH" b="1" u="sng" dirty="0" err="1">
+                <a:gradFill>
+                  <a:gsLst>
+                    <a:gs pos="2917">
+                      <a:srgbClr val="353535"/>
+                    </a:gs>
+                    <a:gs pos="30000">
+                      <a:srgbClr val="353535"/>
+                    </a:gs>
+                  </a:gsLst>
+                  <a:lin ang="5400000" scaled="0"/>
+                </a:gradFill>
+                <a:latin typeface="Roboto Medium" panose="02000000000000000000" pitchFamily="2" charset="0"/>
+                <a:ea typeface="Roboto Medium" panose="02000000000000000000" pitchFamily="2" charset="0"/>
+              </a:rPr>
               <a:t>of</a:t>
             </a:r>
             <a:r>
-              <a:rPr lang="de-CH" dirty="0"/>
+              <a:rPr lang="de-CH" b="1" u="sng" dirty="0">
+                <a:gradFill>
+                  <a:gsLst>
+                    <a:gs pos="2917">
+                      <a:srgbClr val="353535"/>
+                    </a:gs>
+                    <a:gs pos="30000">
+                      <a:srgbClr val="353535"/>
+                    </a:gs>
+                  </a:gsLst>
+                  <a:lin ang="5400000" scaled="0"/>
+                </a:gradFill>
+                <a:latin typeface="Roboto Medium" panose="02000000000000000000" pitchFamily="2" charset="0"/>
+                <a:ea typeface="Roboto Medium" panose="02000000000000000000" pitchFamily="2" charset="0"/>
+              </a:rPr>
               <a:t> </a:t>
             </a:r>
             <a:r>
-              <a:rPr lang="de-CH" dirty="0" err="1"/>
+              <a:rPr lang="de-CH" b="1" u="sng" dirty="0" err="1">
+                <a:gradFill>
+                  <a:gsLst>
+                    <a:gs pos="2917">
+                      <a:srgbClr val="353535"/>
+                    </a:gs>
+                    <a:gs pos="30000">
+                      <a:srgbClr val="353535"/>
+                    </a:gs>
+                  </a:gsLst>
+                  <a:lin ang="5400000" scaled="0"/>
+                </a:gradFill>
+                <a:latin typeface="Roboto Medium" panose="02000000000000000000" pitchFamily="2" charset="0"/>
+                <a:ea typeface="Roboto Medium" panose="02000000000000000000" pitchFamily="2" charset="0"/>
+              </a:rPr>
               <a:t>preprocessing</a:t>
             </a:r>
-            <a:endParaRPr lang="de-CH" dirty="0"/>
+            <a:endParaRPr lang="de-CH" b="1" u="sng" dirty="0">
+              <a:gradFill>
+                <a:gsLst>
+                  <a:gs pos="2917">
+                    <a:srgbClr val="353535"/>
+                  </a:gs>
+                  <a:gs pos="30000">
+                    <a:srgbClr val="353535"/>
+                  </a:gs>
+                </a:gsLst>
+                <a:lin ang="5400000" scaled="0"/>
+              </a:gradFill>
+              <a:latin typeface="Roboto Medium" panose="02000000000000000000" pitchFamily="2" charset="0"/>
+              <a:ea typeface="Roboto Medium" panose="02000000000000000000" pitchFamily="2" charset="0"/>
+            </a:endParaRPr>
           </a:p>
         </p:txBody>
       </p:sp>
       <p:sp>
         <p:nvSpPr>
-          <p:cNvPr id="29" name="TextBox 28">
+          <p:cNvPr id="34" name="TextBox 33">
             <a:extLst>
               <a:ext uri="{FF2B5EF4-FFF2-40B4-BE49-F238E27FC236}">
-                <a16:creationId xmlns:a16="http://schemas.microsoft.com/office/drawing/2014/main" id="{79C1A793-F7BA-4C29-B050-EA92470BA3F1}"/>
+                <a16:creationId xmlns:a16="http://schemas.microsoft.com/office/drawing/2014/main" id="{E7333402-6530-4875-90E2-56B530E73A3F}"/>
               </a:ext>
             </a:extLst>
           </p:cNvPr>
@@ -15473,7 +15732,697 @@
         </p:nvSpPr>
         <p:spPr>
           <a:xfrm>
-            <a:off x="8688887" y="1681018"/>
+            <a:off x="3716286" y="2966412"/>
+            <a:ext cx="467788" cy="369332"/>
+          </a:xfrm>
+          <a:prstGeom prst="rect">
+            <a:avLst/>
+          </a:prstGeom>
+          <a:noFill/>
+        </p:spPr>
+        <p:txBody>
+          <a:bodyPr wrap="square" rtlCol="0">
+            <a:spAutoFit/>
+          </a:bodyPr>
+          <a:lstStyle/>
+          <a:p>
+            <a:r>
+              <a:rPr lang="de-CH" dirty="0">
+                <a:gradFill>
+                  <a:gsLst>
+                    <a:gs pos="2917">
+                      <a:srgbClr val="353535"/>
+                    </a:gs>
+                    <a:gs pos="30000">
+                      <a:srgbClr val="353535"/>
+                    </a:gs>
+                  </a:gsLst>
+                  <a:lin ang="5400000" scaled="0"/>
+                </a:gradFill>
+                <a:latin typeface="Roboto Medium" panose="02000000000000000000" pitchFamily="2" charset="0"/>
+                <a:ea typeface="Roboto Medium" panose="02000000000000000000" pitchFamily="2" charset="0"/>
+              </a:rPr>
+              <a:t>….</a:t>
+            </a:r>
+          </a:p>
+        </p:txBody>
+      </p:sp>
+      <p:sp>
+        <p:nvSpPr>
+          <p:cNvPr id="35" name="TextBox 34">
+            <a:extLst>
+              <a:ext uri="{FF2B5EF4-FFF2-40B4-BE49-F238E27FC236}">
+                <a16:creationId xmlns:a16="http://schemas.microsoft.com/office/drawing/2014/main" id="{660CDDE3-F07B-441B-9BA3-8E696989EB4A}"/>
+              </a:ext>
+            </a:extLst>
+          </p:cNvPr>
+          <p:cNvSpPr txBox="1"/>
+          <p:nvPr/>
+        </p:nvSpPr>
+        <p:spPr>
+          <a:xfrm>
+            <a:off x="3089720" y="1392766"/>
+            <a:ext cx="2586984" cy="369332"/>
+          </a:xfrm>
+          <a:prstGeom prst="rect">
+            <a:avLst/>
+          </a:prstGeom>
+          <a:noFill/>
+        </p:spPr>
+        <p:txBody>
+          <a:bodyPr wrap="square" rtlCol="0">
+            <a:spAutoFit/>
+          </a:bodyPr>
+          <a:lstStyle/>
+          <a:p>
+            <a:r>
+              <a:rPr lang="de-CH" sz="1800" dirty="0" err="1">
+                <a:gradFill>
+                  <a:gsLst>
+                    <a:gs pos="2917">
+                      <a:srgbClr val="353535"/>
+                    </a:gs>
+                    <a:gs pos="30000">
+                      <a:srgbClr val="353535"/>
+                    </a:gs>
+                  </a:gsLst>
+                  <a:lin ang="5400000" scaled="0"/>
+                </a:gradFill>
+                <a:latin typeface="Roboto Medium" panose="02000000000000000000" pitchFamily="2" charset="0"/>
+                <a:ea typeface="Roboto Medium" panose="02000000000000000000" pitchFamily="2" charset="0"/>
+              </a:rPr>
+              <a:t>Column</a:t>
+            </a:r>
+            <a:r>
+              <a:rPr lang="de-CH" dirty="0">
+                <a:gradFill>
+                  <a:gsLst>
+                    <a:gs pos="2917">
+                      <a:srgbClr val="353535"/>
+                    </a:gs>
+                    <a:gs pos="30000">
+                      <a:srgbClr val="353535"/>
+                    </a:gs>
+                  </a:gsLst>
+                  <a:lin ang="5400000" scaled="0"/>
+                </a:gradFill>
+                <a:latin typeface="Roboto Medium" panose="02000000000000000000" pitchFamily="2" charset="0"/>
+                <a:ea typeface="Roboto Medium" panose="02000000000000000000" pitchFamily="2" charset="0"/>
+              </a:rPr>
+              <a:t> </a:t>
+            </a:r>
+            <a:r>
+              <a:rPr lang="de-CH" dirty="0" err="1">
+                <a:gradFill>
+                  <a:gsLst>
+                    <a:gs pos="2917">
+                      <a:srgbClr val="353535"/>
+                    </a:gs>
+                    <a:gs pos="30000">
+                      <a:srgbClr val="353535"/>
+                    </a:gs>
+                  </a:gsLst>
+                  <a:lin ang="5400000" scaled="0"/>
+                </a:gradFill>
+                <a:latin typeface="Roboto Medium" panose="02000000000000000000" pitchFamily="2" charset="0"/>
+                <a:ea typeface="Roboto Medium" panose="02000000000000000000" pitchFamily="2" charset="0"/>
+              </a:rPr>
+              <a:t>renaming</a:t>
+            </a:r>
+            <a:endParaRPr lang="de-CH" dirty="0"/>
+          </a:p>
+        </p:txBody>
+      </p:sp>
+      <p:sp>
+        <p:nvSpPr>
+          <p:cNvPr id="37" name="TextBox 36">
+            <a:extLst>
+              <a:ext uri="{FF2B5EF4-FFF2-40B4-BE49-F238E27FC236}">
+                <a16:creationId xmlns:a16="http://schemas.microsoft.com/office/drawing/2014/main" id="{D629F60B-8E4A-4C80-94D6-DF71800ADF0F}"/>
+              </a:ext>
+            </a:extLst>
+          </p:cNvPr>
+          <p:cNvSpPr txBox="1"/>
+          <p:nvPr/>
+        </p:nvSpPr>
+        <p:spPr>
+          <a:xfrm>
+            <a:off x="6092573" y="1258252"/>
+            <a:ext cx="3040541" cy="646331"/>
+          </a:xfrm>
+          <a:prstGeom prst="rect">
+            <a:avLst/>
+          </a:prstGeom>
+          <a:noFill/>
+        </p:spPr>
+        <p:txBody>
+          <a:bodyPr wrap="square" rtlCol="0">
+            <a:spAutoFit/>
+          </a:bodyPr>
+          <a:lstStyle/>
+          <a:p>
+            <a:r>
+              <a:rPr lang="de-CH" sz="1800" dirty="0">
+                <a:gradFill>
+                  <a:gsLst>
+                    <a:gs pos="2917">
+                      <a:srgbClr val="353535"/>
+                    </a:gs>
+                    <a:gs pos="30000">
+                      <a:srgbClr val="353535"/>
+                    </a:gs>
+                  </a:gsLst>
+                  <a:lin ang="5400000" scaled="0"/>
+                </a:gradFill>
+                <a:latin typeface="Roboto Medium" panose="02000000000000000000" pitchFamily="2" charset="0"/>
+                <a:ea typeface="Roboto Medium" panose="02000000000000000000" pitchFamily="2" charset="0"/>
+              </a:rPr>
+              <a:t>UOM </a:t>
+            </a:r>
+            <a:r>
+              <a:rPr lang="de-CH" sz="1800" dirty="0" err="1">
+                <a:gradFill>
+                  <a:gsLst>
+                    <a:gs pos="2917">
+                      <a:srgbClr val="353535"/>
+                    </a:gs>
+                    <a:gs pos="30000">
+                      <a:srgbClr val="353535"/>
+                    </a:gs>
+                  </a:gsLst>
+                  <a:lin ang="5400000" scaled="0"/>
+                </a:gradFill>
+                <a:latin typeface="Roboto Medium" panose="02000000000000000000" pitchFamily="2" charset="0"/>
+                <a:ea typeface="Roboto Medium" panose="02000000000000000000" pitchFamily="2" charset="0"/>
+              </a:rPr>
+              <a:t>adjustement</a:t>
+            </a:r>
+            <a:endParaRPr lang="de-CH" sz="1800" dirty="0">
+              <a:gradFill>
+                <a:gsLst>
+                  <a:gs pos="2917">
+                    <a:srgbClr val="353535"/>
+                  </a:gs>
+                  <a:gs pos="30000">
+                    <a:srgbClr val="353535"/>
+                  </a:gs>
+                </a:gsLst>
+                <a:lin ang="5400000" scaled="0"/>
+              </a:gradFill>
+              <a:latin typeface="Roboto Medium" panose="02000000000000000000" pitchFamily="2" charset="0"/>
+              <a:ea typeface="Roboto Medium" panose="02000000000000000000" pitchFamily="2" charset="0"/>
+            </a:endParaRPr>
+          </a:p>
+          <a:p>
+            <a:r>
+              <a:rPr lang="de-CH" dirty="0"/>
+              <a:t>- Different UOM per </a:t>
+            </a:r>
+            <a:r>
+              <a:rPr lang="de-CH" dirty="0" err="1"/>
+              <a:t>column</a:t>
+            </a:r>
+            <a:endParaRPr lang="de-CH" dirty="0"/>
+          </a:p>
+        </p:txBody>
+      </p:sp>
+      <p:sp>
+        <p:nvSpPr>
+          <p:cNvPr id="38" name="TextBox 37">
+            <a:extLst>
+              <a:ext uri="{FF2B5EF4-FFF2-40B4-BE49-F238E27FC236}">
+                <a16:creationId xmlns:a16="http://schemas.microsoft.com/office/drawing/2014/main" id="{25B28C72-8084-4432-ABC3-A33573C4A8F1}"/>
+              </a:ext>
+            </a:extLst>
+          </p:cNvPr>
+          <p:cNvSpPr txBox="1"/>
+          <p:nvPr/>
+        </p:nvSpPr>
+        <p:spPr>
+          <a:xfrm>
+            <a:off x="9336891" y="1126561"/>
+            <a:ext cx="2586984" cy="923330"/>
+          </a:xfrm>
+          <a:prstGeom prst="rect">
+            <a:avLst/>
+          </a:prstGeom>
+          <a:noFill/>
+        </p:spPr>
+        <p:txBody>
+          <a:bodyPr wrap="square" rtlCol="0">
+            <a:spAutoFit/>
+          </a:bodyPr>
+          <a:lstStyle/>
+          <a:p>
+            <a:r>
+              <a:rPr lang="de-CH" dirty="0" err="1">
+                <a:gradFill>
+                  <a:gsLst>
+                    <a:gs pos="2917">
+                      <a:srgbClr val="353535"/>
+                    </a:gs>
+                    <a:gs pos="30000">
+                      <a:srgbClr val="353535"/>
+                    </a:gs>
+                  </a:gsLst>
+                  <a:lin ang="5400000" scaled="0"/>
+                </a:gradFill>
+                <a:latin typeface="Roboto Medium" panose="02000000000000000000" pitchFamily="2" charset="0"/>
+                <a:ea typeface="Roboto Medium" panose="02000000000000000000" pitchFamily="2" charset="0"/>
+              </a:rPr>
+              <a:t>Removing</a:t>
+            </a:r>
+            <a:r>
+              <a:rPr lang="de-CH" dirty="0">
+                <a:gradFill>
+                  <a:gsLst>
+                    <a:gs pos="2917">
+                      <a:srgbClr val="353535"/>
+                    </a:gs>
+                    <a:gs pos="30000">
+                      <a:srgbClr val="353535"/>
+                    </a:gs>
+                  </a:gsLst>
+                  <a:lin ang="5400000" scaled="0"/>
+                </a:gradFill>
+                <a:latin typeface="Roboto Medium" panose="02000000000000000000" pitchFamily="2" charset="0"/>
+                <a:ea typeface="Roboto Medium" panose="02000000000000000000" pitchFamily="2" charset="0"/>
+              </a:rPr>
+              <a:t> </a:t>
+            </a:r>
+            <a:r>
+              <a:rPr lang="de-CH" dirty="0" err="1">
+                <a:gradFill>
+                  <a:gsLst>
+                    <a:gs pos="2917">
+                      <a:srgbClr val="353535"/>
+                    </a:gs>
+                    <a:gs pos="30000">
+                      <a:srgbClr val="353535"/>
+                    </a:gs>
+                  </a:gsLst>
+                  <a:lin ang="5400000" scaled="0"/>
+                </a:gradFill>
+                <a:latin typeface="Roboto Medium" panose="02000000000000000000" pitchFamily="2" charset="0"/>
+                <a:ea typeface="Roboto Medium" panose="02000000000000000000" pitchFamily="2" charset="0"/>
+              </a:rPr>
+              <a:t>columns</a:t>
+            </a:r>
+            <a:endParaRPr lang="de-CH" dirty="0">
+              <a:gradFill>
+                <a:gsLst>
+                  <a:gs pos="2917">
+                    <a:srgbClr val="353535"/>
+                  </a:gs>
+                  <a:gs pos="30000">
+                    <a:srgbClr val="353535"/>
+                  </a:gs>
+                </a:gsLst>
+                <a:lin ang="5400000" scaled="0"/>
+              </a:gradFill>
+              <a:latin typeface="Roboto Medium" panose="02000000000000000000" pitchFamily="2" charset="0"/>
+              <a:ea typeface="Roboto Medium" panose="02000000000000000000" pitchFamily="2" charset="0"/>
+            </a:endParaRPr>
+          </a:p>
+          <a:p>
+            <a:pPr marL="285750" indent="-285750">
+              <a:buFontTx/>
+              <a:buChar char="-"/>
+            </a:pPr>
+            <a:r>
+              <a:rPr lang="de-CH" dirty="0"/>
+              <a:t>Columns </a:t>
+            </a:r>
+            <a:r>
+              <a:rPr lang="de-CH" dirty="0" err="1"/>
+              <a:t>to</a:t>
+            </a:r>
+            <a:r>
+              <a:rPr lang="de-CH" dirty="0"/>
+              <a:t> </a:t>
+            </a:r>
+            <a:r>
+              <a:rPr lang="de-CH" dirty="0" err="1"/>
+              <a:t>remove</a:t>
+            </a:r>
+            <a:endParaRPr lang="de-CH" dirty="0"/>
+          </a:p>
+          <a:p>
+            <a:pPr marL="285750" indent="-285750">
+              <a:buFontTx/>
+              <a:buChar char="-"/>
+            </a:pPr>
+            <a:r>
+              <a:rPr lang="de-CH" dirty="0" err="1"/>
+              <a:t>Based</a:t>
+            </a:r>
+            <a:r>
+              <a:rPr lang="de-CH" dirty="0"/>
+              <a:t> on....?</a:t>
+            </a:r>
+          </a:p>
+        </p:txBody>
+      </p:sp>
+      <p:sp>
+        <p:nvSpPr>
+          <p:cNvPr id="40" name="TextBox 39">
+            <a:extLst>
+              <a:ext uri="{FF2B5EF4-FFF2-40B4-BE49-F238E27FC236}">
+                <a16:creationId xmlns:a16="http://schemas.microsoft.com/office/drawing/2014/main" id="{74B851F5-6EF6-4C0B-BBDF-3E3EDC21A7CB}"/>
+              </a:ext>
+            </a:extLst>
+          </p:cNvPr>
+          <p:cNvSpPr txBox="1"/>
+          <p:nvPr/>
+        </p:nvSpPr>
+        <p:spPr>
+          <a:xfrm>
+            <a:off x="329685" y="2550916"/>
+            <a:ext cx="2586984" cy="1200329"/>
+          </a:xfrm>
+          <a:prstGeom prst="rect">
+            <a:avLst/>
+          </a:prstGeom>
+          <a:noFill/>
+        </p:spPr>
+        <p:txBody>
+          <a:bodyPr wrap="square" rtlCol="0">
+            <a:spAutoFit/>
+          </a:bodyPr>
+          <a:lstStyle/>
+          <a:p>
+            <a:r>
+              <a:rPr lang="de-CH" dirty="0" err="1">
+                <a:gradFill>
+                  <a:gsLst>
+                    <a:gs pos="2917">
+                      <a:srgbClr val="353535"/>
+                    </a:gs>
+                    <a:gs pos="30000">
+                      <a:srgbClr val="353535"/>
+                    </a:gs>
+                  </a:gsLst>
+                  <a:lin ang="5400000" scaled="0"/>
+                </a:gradFill>
+                <a:latin typeface="Roboto Medium" panose="02000000000000000000" pitchFamily="2" charset="0"/>
+                <a:ea typeface="Roboto Medium" panose="02000000000000000000" pitchFamily="2" charset="0"/>
+              </a:rPr>
+              <a:t>Hotencoding</a:t>
+            </a:r>
+            <a:r>
+              <a:rPr lang="de-CH" dirty="0">
+                <a:gradFill>
+                  <a:gsLst>
+                    <a:gs pos="2917">
+                      <a:srgbClr val="353535"/>
+                    </a:gs>
+                    <a:gs pos="30000">
+                      <a:srgbClr val="353535"/>
+                    </a:gs>
+                  </a:gsLst>
+                  <a:lin ang="5400000" scaled="0"/>
+                </a:gradFill>
+                <a:latin typeface="Roboto Medium" panose="02000000000000000000" pitchFamily="2" charset="0"/>
+                <a:ea typeface="Roboto Medium" panose="02000000000000000000" pitchFamily="2" charset="0"/>
+              </a:rPr>
+              <a:t> and «</a:t>
+            </a:r>
+            <a:r>
+              <a:rPr lang="de-CH" dirty="0" err="1">
+                <a:gradFill>
+                  <a:gsLst>
+                    <a:gs pos="2917">
+                      <a:srgbClr val="353535"/>
+                    </a:gs>
+                    <a:gs pos="30000">
+                      <a:srgbClr val="353535"/>
+                    </a:gs>
+                  </a:gsLst>
+                  <a:lin ang="5400000" scaled="0"/>
+                </a:gradFill>
+                <a:latin typeface="Roboto Medium" panose="02000000000000000000" pitchFamily="2" charset="0"/>
+                <a:ea typeface="Roboto Medium" panose="02000000000000000000" pitchFamily="2" charset="0"/>
+              </a:rPr>
+              <a:t>numerisation</a:t>
+            </a:r>
+            <a:r>
+              <a:rPr lang="de-CH" dirty="0">
+                <a:gradFill>
+                  <a:gsLst>
+                    <a:gs pos="2917">
+                      <a:srgbClr val="353535"/>
+                    </a:gs>
+                    <a:gs pos="30000">
+                      <a:srgbClr val="353535"/>
+                    </a:gs>
+                  </a:gsLst>
+                  <a:lin ang="5400000" scaled="0"/>
+                </a:gradFill>
+                <a:latin typeface="Roboto Medium" panose="02000000000000000000" pitchFamily="2" charset="0"/>
+                <a:ea typeface="Roboto Medium" panose="02000000000000000000" pitchFamily="2" charset="0"/>
+              </a:rPr>
+              <a:t>»</a:t>
+            </a:r>
+          </a:p>
+          <a:p>
+            <a:pPr marL="285750" indent="-285750">
+              <a:buFontTx/>
+              <a:buChar char="-"/>
+            </a:pPr>
+            <a:r>
+              <a:rPr lang="de-CH" dirty="0" err="1"/>
+              <a:t>Which</a:t>
+            </a:r>
+            <a:r>
+              <a:rPr lang="de-CH" dirty="0"/>
+              <a:t> </a:t>
+            </a:r>
+            <a:r>
+              <a:rPr lang="de-CH" dirty="0" err="1"/>
+              <a:t>features</a:t>
+            </a:r>
+            <a:endParaRPr lang="de-CH" dirty="0"/>
+          </a:p>
+          <a:p>
+            <a:pPr marL="285750" indent="-285750">
+              <a:buFontTx/>
+              <a:buChar char="-"/>
+            </a:pPr>
+            <a:r>
+              <a:rPr lang="de-CH" dirty="0" err="1"/>
+              <a:t>How</a:t>
+            </a:r>
+            <a:r>
+              <a:rPr lang="de-CH" dirty="0"/>
+              <a:t>, </a:t>
+            </a:r>
+            <a:r>
+              <a:rPr lang="de-CH" dirty="0" err="1"/>
+              <a:t>based</a:t>
+            </a:r>
+            <a:r>
+              <a:rPr lang="de-CH" dirty="0"/>
+              <a:t> on </a:t>
+            </a:r>
+            <a:r>
+              <a:rPr lang="de-CH" dirty="0" err="1"/>
+              <a:t>what</a:t>
+            </a:r>
+            <a:endParaRPr lang="de-CH" dirty="0"/>
+          </a:p>
+        </p:txBody>
+      </p:sp>
+      <p:cxnSp>
+        <p:nvCxnSpPr>
+          <p:cNvPr id="17" name="Straight Arrow Connector 16">
+            <a:extLst>
+              <a:ext uri="{FF2B5EF4-FFF2-40B4-BE49-F238E27FC236}">
+                <a16:creationId xmlns:a16="http://schemas.microsoft.com/office/drawing/2014/main" id="{C931018C-1A1E-4206-9D6F-E6EF0261EA21}"/>
+              </a:ext>
+            </a:extLst>
+          </p:cNvPr>
+          <p:cNvCxnSpPr>
+            <a:cxnSpLocks/>
+            <a:stCxn id="40" idx="3"/>
+            <a:endCxn id="34" idx="1"/>
+          </p:cNvCxnSpPr>
+          <p:nvPr/>
+        </p:nvCxnSpPr>
+        <p:spPr>
+          <a:xfrm flipV="1">
+            <a:off x="2916669" y="3151078"/>
+            <a:ext cx="799617" cy="3"/>
+          </a:xfrm>
+          <a:prstGeom prst="straightConnector1">
+            <a:avLst/>
+          </a:prstGeom>
+          <a:ln>
+            <a:tailEnd type="triangle"/>
+          </a:ln>
+        </p:spPr>
+        <p:style>
+          <a:lnRef idx="1">
+            <a:schemeClr val="accent1"/>
+          </a:lnRef>
+          <a:fillRef idx="0">
+            <a:schemeClr val="accent1"/>
+          </a:fillRef>
+          <a:effectRef idx="0">
+            <a:schemeClr val="accent1"/>
+          </a:effectRef>
+          <a:fontRef idx="minor">
+            <a:schemeClr val="tx1"/>
+          </a:fontRef>
+        </p:style>
+      </p:cxnSp>
+      <p:cxnSp>
+        <p:nvCxnSpPr>
+          <p:cNvPr id="22" name="Straight Arrow Connector 21">
+            <a:extLst>
+              <a:ext uri="{FF2B5EF4-FFF2-40B4-BE49-F238E27FC236}">
+                <a16:creationId xmlns:a16="http://schemas.microsoft.com/office/drawing/2014/main" id="{A20AB774-7C1E-414A-A2EE-40B5CF8A8F44}"/>
+              </a:ext>
+            </a:extLst>
+          </p:cNvPr>
+          <p:cNvCxnSpPr>
+            <a:cxnSpLocks/>
+            <a:stCxn id="35" idx="3"/>
+            <a:endCxn id="37" idx="1"/>
+          </p:cNvCxnSpPr>
+          <p:nvPr/>
+        </p:nvCxnSpPr>
+        <p:spPr>
+          <a:xfrm>
+            <a:off x="5676704" y="1577432"/>
+            <a:ext cx="415869" cy="3986"/>
+          </a:xfrm>
+          <a:prstGeom prst="straightConnector1">
+            <a:avLst/>
+          </a:prstGeom>
+          <a:ln>
+            <a:tailEnd type="triangle"/>
+          </a:ln>
+        </p:spPr>
+        <p:style>
+          <a:lnRef idx="1">
+            <a:schemeClr val="accent1"/>
+          </a:lnRef>
+          <a:fillRef idx="0">
+            <a:schemeClr val="accent1"/>
+          </a:fillRef>
+          <a:effectRef idx="0">
+            <a:schemeClr val="accent1"/>
+          </a:effectRef>
+          <a:fontRef idx="minor">
+            <a:schemeClr val="tx1"/>
+          </a:fontRef>
+        </p:style>
+      </p:cxnSp>
+      <p:cxnSp>
+        <p:nvCxnSpPr>
+          <p:cNvPr id="43" name="Straight Arrow Connector 42">
+            <a:extLst>
+              <a:ext uri="{FF2B5EF4-FFF2-40B4-BE49-F238E27FC236}">
+                <a16:creationId xmlns:a16="http://schemas.microsoft.com/office/drawing/2014/main" id="{A2B6C5FE-9B95-4D2C-BEA6-A37A50F5E932}"/>
+              </a:ext>
+            </a:extLst>
+          </p:cNvPr>
+          <p:cNvCxnSpPr>
+            <a:cxnSpLocks/>
+            <a:stCxn id="37" idx="3"/>
+            <a:endCxn id="38" idx="1"/>
+          </p:cNvCxnSpPr>
+          <p:nvPr/>
+        </p:nvCxnSpPr>
+        <p:spPr>
+          <a:xfrm>
+            <a:off x="9133114" y="1581418"/>
+            <a:ext cx="203777" cy="6808"/>
+          </a:xfrm>
+          <a:prstGeom prst="straightConnector1">
+            <a:avLst/>
+          </a:prstGeom>
+          <a:ln>
+            <a:tailEnd type="triangle"/>
+          </a:ln>
+        </p:spPr>
+        <p:style>
+          <a:lnRef idx="1">
+            <a:schemeClr val="accent1"/>
+          </a:lnRef>
+          <a:fillRef idx="0">
+            <a:schemeClr val="accent1"/>
+          </a:fillRef>
+          <a:effectRef idx="0">
+            <a:schemeClr val="accent1"/>
+          </a:effectRef>
+          <a:fontRef idx="minor">
+            <a:schemeClr val="tx1"/>
+          </a:fontRef>
+        </p:style>
+      </p:cxnSp>
+      <p:cxnSp>
+        <p:nvCxnSpPr>
+          <p:cNvPr id="47" name="Connector: Elbow 46">
+            <a:extLst>
+              <a:ext uri="{FF2B5EF4-FFF2-40B4-BE49-F238E27FC236}">
+                <a16:creationId xmlns:a16="http://schemas.microsoft.com/office/drawing/2014/main" id="{76D7CC10-BF46-44FC-B23E-A2BF92C740B8}"/>
+              </a:ext>
+            </a:extLst>
+          </p:cNvPr>
+          <p:cNvCxnSpPr>
+            <a:cxnSpLocks/>
+            <a:stCxn id="38" idx="3"/>
+            <a:endCxn id="40" idx="1"/>
+          </p:cNvCxnSpPr>
+          <p:nvPr/>
+        </p:nvCxnSpPr>
+        <p:spPr>
+          <a:xfrm flipH="1">
+            <a:off x="329685" y="1588226"/>
+            <a:ext cx="11594190" cy="1562855"/>
+          </a:xfrm>
+          <a:prstGeom prst="bentConnector5">
+            <a:avLst>
+              <a:gd name="adj1" fmla="val -857"/>
+              <a:gd name="adj2" fmla="val 45569"/>
+              <a:gd name="adj3" fmla="val 101175"/>
+            </a:avLst>
+          </a:prstGeom>
+          <a:ln>
+            <a:tailEnd type="triangle"/>
+          </a:ln>
+        </p:spPr>
+        <p:style>
+          <a:lnRef idx="1">
+            <a:schemeClr val="accent1"/>
+          </a:lnRef>
+          <a:fillRef idx="0">
+            <a:schemeClr val="accent1"/>
+          </a:fillRef>
+          <a:effectRef idx="0">
+            <a:schemeClr val="accent1"/>
+          </a:effectRef>
+          <a:fontRef idx="minor">
+            <a:schemeClr val="tx1"/>
+          </a:fontRef>
+        </p:style>
+      </p:cxnSp>
+      <p:sp>
+        <p:nvSpPr>
+          <p:cNvPr id="71" name="TextBox 70">
+            <a:extLst>
+              <a:ext uri="{FF2B5EF4-FFF2-40B4-BE49-F238E27FC236}">
+                <a16:creationId xmlns:a16="http://schemas.microsoft.com/office/drawing/2014/main" id="{990AC346-F323-4814-AAD7-4670A8794299}"/>
+              </a:ext>
+            </a:extLst>
+          </p:cNvPr>
+          <p:cNvSpPr txBox="1"/>
+          <p:nvPr/>
+        </p:nvSpPr>
+        <p:spPr>
+          <a:xfrm>
+            <a:off x="4726860" y="2827394"/>
             <a:ext cx="2059709" cy="646331"/>
           </a:xfrm>
           <a:prstGeom prst="rect">
@@ -15488,109 +16437,242 @@
           <a:lstStyle/>
           <a:p>
             <a:r>
-              <a:rPr lang="de-CH" dirty="0" err="1"/>
+              <a:rPr lang="de-CH" b="1" u="sng" dirty="0" err="1">
+                <a:gradFill>
+                  <a:gsLst>
+                    <a:gs pos="2917">
+                      <a:srgbClr val="353535"/>
+                    </a:gs>
+                    <a:gs pos="30000">
+                      <a:srgbClr val="353535"/>
+                    </a:gs>
+                  </a:gsLst>
+                  <a:lin ang="5400000" scaled="0"/>
+                </a:gradFill>
+                <a:latin typeface="Roboto Medium" panose="02000000000000000000" pitchFamily="2" charset="0"/>
+                <a:ea typeface="Roboto Medium" panose="02000000000000000000" pitchFamily="2" charset="0"/>
+              </a:rPr>
               <a:t>Result</a:t>
             </a:r>
             <a:r>
-              <a:rPr lang="de-CH" dirty="0"/>
+              <a:rPr lang="de-CH" b="1" u="sng" dirty="0">
+                <a:gradFill>
+                  <a:gsLst>
+                    <a:gs pos="2917">
+                      <a:srgbClr val="353535"/>
+                    </a:gs>
+                    <a:gs pos="30000">
+                      <a:srgbClr val="353535"/>
+                    </a:gs>
+                  </a:gsLst>
+                  <a:lin ang="5400000" scaled="0"/>
+                </a:gradFill>
+                <a:latin typeface="Roboto Medium" panose="02000000000000000000" pitchFamily="2" charset="0"/>
+                <a:ea typeface="Roboto Medium" panose="02000000000000000000" pitchFamily="2" charset="0"/>
+              </a:rPr>
               <a:t> </a:t>
             </a:r>
             <a:r>
-              <a:rPr lang="de-CH" dirty="0" err="1"/>
+              <a:rPr lang="de-CH" b="1" u="sng" dirty="0" err="1">
+                <a:gradFill>
+                  <a:gsLst>
+                    <a:gs pos="2917">
+                      <a:srgbClr val="353535"/>
+                    </a:gs>
+                    <a:gs pos="30000">
+                      <a:srgbClr val="353535"/>
+                    </a:gs>
+                  </a:gsLst>
+                  <a:lin ang="5400000" scaled="0"/>
+                </a:gradFill>
+                <a:latin typeface="Roboto Medium" panose="02000000000000000000" pitchFamily="2" charset="0"/>
+                <a:ea typeface="Roboto Medium" panose="02000000000000000000" pitchFamily="2" charset="0"/>
+              </a:rPr>
               <a:t>of</a:t>
             </a:r>
             <a:r>
-              <a:rPr lang="de-CH" dirty="0"/>
+              <a:rPr lang="de-CH" b="1" u="sng" dirty="0">
+                <a:gradFill>
+                  <a:gsLst>
+                    <a:gs pos="2917">
+                      <a:srgbClr val="353535"/>
+                    </a:gs>
+                    <a:gs pos="30000">
+                      <a:srgbClr val="353535"/>
+                    </a:gs>
+                  </a:gsLst>
+                  <a:lin ang="5400000" scaled="0"/>
+                </a:gradFill>
+                <a:latin typeface="Roboto Medium" panose="02000000000000000000" pitchFamily="2" charset="0"/>
+                <a:ea typeface="Roboto Medium" panose="02000000000000000000" pitchFamily="2" charset="0"/>
+              </a:rPr>
               <a:t> </a:t>
             </a:r>
             <a:r>
-              <a:rPr lang="de-CH" dirty="0" err="1"/>
+              <a:rPr lang="de-CH" b="1" u="sng" dirty="0" err="1">
+                <a:gradFill>
+                  <a:gsLst>
+                    <a:gs pos="2917">
+                      <a:srgbClr val="353535"/>
+                    </a:gs>
+                    <a:gs pos="30000">
+                      <a:srgbClr val="353535"/>
+                    </a:gs>
+                  </a:gsLst>
+                  <a:lin ang="5400000" scaled="0"/>
+                </a:gradFill>
+                <a:latin typeface="Roboto Medium" panose="02000000000000000000" pitchFamily="2" charset="0"/>
+                <a:ea typeface="Roboto Medium" panose="02000000000000000000" pitchFamily="2" charset="0"/>
+              </a:rPr>
               <a:t>preprocessing</a:t>
             </a:r>
-            <a:endParaRPr lang="de-CH" dirty="0"/>
+            <a:endParaRPr lang="de-CH" b="1" u="sng" dirty="0">
+              <a:gradFill>
+                <a:gsLst>
+                  <a:gs pos="2917">
+                    <a:srgbClr val="353535"/>
+                  </a:gs>
+                  <a:gs pos="30000">
+                    <a:srgbClr val="353535"/>
+                  </a:gs>
+                </a:gsLst>
+                <a:lin ang="5400000" scaled="0"/>
+              </a:gradFill>
+              <a:latin typeface="Roboto Medium" panose="02000000000000000000" pitchFamily="2" charset="0"/>
+              <a:ea typeface="Roboto Medium" panose="02000000000000000000" pitchFamily="2" charset="0"/>
+            </a:endParaRPr>
           </a:p>
         </p:txBody>
       </p:sp>
-      <p:sp>
-        <p:nvSpPr>
-          <p:cNvPr id="30" name="TextBox 29">
+      <p:cxnSp>
+        <p:nvCxnSpPr>
+          <p:cNvPr id="73" name="Straight Arrow Connector 72">
             <a:extLst>
               <a:ext uri="{FF2B5EF4-FFF2-40B4-BE49-F238E27FC236}">
-                <a16:creationId xmlns:a16="http://schemas.microsoft.com/office/drawing/2014/main" id="{FBD46E3F-F3B2-4A2B-8AAA-38E3056E1A94}"/>
+                <a16:creationId xmlns:a16="http://schemas.microsoft.com/office/drawing/2014/main" id="{2987F793-0001-4F2D-B73D-1EE2BDECC5A2}"/>
               </a:ext>
             </a:extLst>
           </p:cNvPr>
-          <p:cNvSpPr txBox="1"/>
+          <p:cNvCxnSpPr>
+            <a:cxnSpLocks/>
+            <a:stCxn id="34" idx="3"/>
+            <a:endCxn id="71" idx="1"/>
+          </p:cNvCxnSpPr>
           <p:nvPr/>
-        </p:nvSpPr>
+        </p:nvCxnSpPr>
         <p:spPr>
-          <a:xfrm>
-            <a:off x="3335901" y="3890011"/>
-            <a:ext cx="2059709" cy="369332"/>
+          <a:xfrm flipV="1">
+            <a:off x="4184074" y="3150560"/>
+            <a:ext cx="542786" cy="518"/>
           </a:xfrm>
-          <a:prstGeom prst="rect">
+          <a:prstGeom prst="straightConnector1">
             <a:avLst/>
           </a:prstGeom>
-          <a:noFill/>
+          <a:ln>
+            <a:tailEnd type="triangle"/>
+          </a:ln>
         </p:spPr>
-        <p:txBody>
-          <a:bodyPr wrap="square" rtlCol="0">
-            <a:spAutoFit/>
-          </a:bodyPr>
-          <a:lstStyle/>
-          <a:p>
-            <a:r>
-              <a:rPr lang="de-CH" dirty="0"/>
-              <a:t>New </a:t>
-            </a:r>
-            <a:r>
-              <a:rPr lang="de-CH" dirty="0" err="1"/>
-              <a:t>method</a:t>
-            </a:r>
-            <a:endParaRPr lang="de-CH" dirty="0"/>
-          </a:p>
-        </p:txBody>
-      </p:sp>
-      <p:sp>
-        <p:nvSpPr>
-          <p:cNvPr id="33" name="TextBox 32">
+        <p:style>
+          <a:lnRef idx="1">
+            <a:schemeClr val="accent1"/>
+          </a:lnRef>
+          <a:fillRef idx="0">
+            <a:schemeClr val="accent1"/>
+          </a:fillRef>
+          <a:effectRef idx="0">
+            <a:schemeClr val="accent1"/>
+          </a:effectRef>
+          <a:fontRef idx="minor">
+            <a:schemeClr val="tx1"/>
+          </a:fontRef>
+        </p:style>
+      </p:cxnSp>
+      <p:cxnSp>
+        <p:nvCxnSpPr>
+          <p:cNvPr id="81" name="Straight Arrow Connector 80">
             <a:extLst>
               <a:ext uri="{FF2B5EF4-FFF2-40B4-BE49-F238E27FC236}">
-                <a16:creationId xmlns:a16="http://schemas.microsoft.com/office/drawing/2014/main" id="{A9F40E1E-0061-4022-B7A0-E8F0CFBFA456}"/>
+                <a16:creationId xmlns:a16="http://schemas.microsoft.com/office/drawing/2014/main" id="{016072C9-600A-4EAC-9F52-7D13312D654B}"/>
               </a:ext>
             </a:extLst>
           </p:cNvPr>
-          <p:cNvSpPr txBox="1"/>
+          <p:cNvCxnSpPr>
+            <a:cxnSpLocks/>
+            <a:stCxn id="25" idx="3"/>
+            <a:endCxn id="28" idx="1"/>
+          </p:cNvCxnSpPr>
           <p:nvPr/>
-        </p:nvSpPr>
+        </p:nvCxnSpPr>
         <p:spPr>
           <a:xfrm>
-            <a:off x="3335900" y="4987339"/>
-            <a:ext cx="2059709" cy="369332"/>
+            <a:off x="5477164" y="4896624"/>
+            <a:ext cx="3927715" cy="2889"/>
           </a:xfrm>
-          <a:prstGeom prst="rect">
+          <a:prstGeom prst="straightConnector1">
             <a:avLst/>
           </a:prstGeom>
-          <a:noFill/>
+          <a:ln>
+            <a:tailEnd type="triangle"/>
+          </a:ln>
         </p:spPr>
-        <p:txBody>
-          <a:bodyPr wrap="square" rtlCol="0">
-            <a:spAutoFit/>
-          </a:bodyPr>
-          <a:lstStyle/>
-          <a:p>
-            <a:r>
-              <a:rPr lang="de-CH" dirty="0"/>
-              <a:t>New </a:t>
-            </a:r>
-            <a:r>
-              <a:rPr lang="de-CH" dirty="0" err="1"/>
-              <a:t>method</a:t>
-            </a:r>
-            <a:endParaRPr lang="de-CH" dirty="0"/>
-          </a:p>
-        </p:txBody>
-      </p:sp>
+        <p:style>
+          <a:lnRef idx="1">
+            <a:schemeClr val="accent1"/>
+          </a:lnRef>
+          <a:fillRef idx="0">
+            <a:schemeClr val="accent1"/>
+          </a:fillRef>
+          <a:effectRef idx="0">
+            <a:schemeClr val="accent1"/>
+          </a:effectRef>
+          <a:fontRef idx="minor">
+            <a:schemeClr val="tx1"/>
+          </a:fontRef>
+        </p:style>
+      </p:cxnSp>
+      <p:cxnSp>
+        <p:nvCxnSpPr>
+          <p:cNvPr id="85" name="Straight Arrow Connector 84">
+            <a:extLst>
+              <a:ext uri="{FF2B5EF4-FFF2-40B4-BE49-F238E27FC236}">
+                <a16:creationId xmlns:a16="http://schemas.microsoft.com/office/drawing/2014/main" id="{902FC0EA-A999-400B-BFB8-72F5188ECD8E}"/>
+              </a:ext>
+            </a:extLst>
+          </p:cNvPr>
+          <p:cNvCxnSpPr>
+            <a:cxnSpLocks/>
+            <a:stCxn id="15" idx="3"/>
+            <a:endCxn id="35" idx="1"/>
+          </p:cNvCxnSpPr>
+          <p:nvPr/>
+        </p:nvCxnSpPr>
+        <p:spPr>
+          <a:xfrm flipV="1">
+            <a:off x="2625703" y="1577432"/>
+            <a:ext cx="464017" cy="1"/>
+          </a:xfrm>
+          <a:prstGeom prst="straightConnector1">
+            <a:avLst/>
+          </a:prstGeom>
+          <a:ln>
+            <a:tailEnd type="triangle"/>
+          </a:ln>
+        </p:spPr>
+        <p:style>
+          <a:lnRef idx="1">
+            <a:schemeClr val="accent1"/>
+          </a:lnRef>
+          <a:fillRef idx="0">
+            <a:schemeClr val="accent1"/>
+          </a:fillRef>
+          <a:effectRef idx="0">
+            <a:schemeClr val="accent1"/>
+          </a:effectRef>
+          <a:fontRef idx="minor">
+            <a:schemeClr val="tx1"/>
+          </a:fontRef>
+        </p:style>
+      </p:cxnSp>
     </p:spTree>
     <p:extLst>
       <p:ext uri="{BB962C8B-B14F-4D97-AF65-F5344CB8AC3E}">
@@ -15701,6 +16783,474 @@
                       </p:childTnLst>
                     </p:cTn>
                   </p:par>
+                  <p:par>
+                    <p:cTn id="11" fill="hold">
+                      <p:stCondLst>
+                        <p:cond delay="indefinite"/>
+                      </p:stCondLst>
+                      <p:childTnLst>
+                        <p:par>
+                          <p:cTn id="12" fill="hold">
+                            <p:stCondLst>
+                              <p:cond delay="0"/>
+                            </p:stCondLst>
+                            <p:childTnLst>
+                              <p:par>
+                                <p:cTn id="13" presetID="1" presetClass="entr" presetSubtype="0" fill="hold" grpId="0" nodeType="clickEffect">
+                                  <p:stCondLst>
+                                    <p:cond delay="0"/>
+                                  </p:stCondLst>
+                                  <p:childTnLst>
+                                    <p:set>
+                                      <p:cBhvr>
+                                        <p:cTn id="14" dur="1" fill="hold">
+                                          <p:stCondLst>
+                                            <p:cond delay="0"/>
+                                          </p:stCondLst>
+                                        </p:cTn>
+                                        <p:tgtEl>
+                                          <p:spTgt spid="15"/>
+                                        </p:tgtEl>
+                                        <p:attrNameLst>
+                                          <p:attrName>style.visibility</p:attrName>
+                                        </p:attrNameLst>
+                                      </p:cBhvr>
+                                      <p:to>
+                                        <p:strVal val="visible"/>
+                                      </p:to>
+                                    </p:set>
+                                  </p:childTnLst>
+                                </p:cTn>
+                              </p:par>
+                              <p:par>
+                                <p:cTn id="15" presetID="1" presetClass="entr" presetSubtype="0" fill="hold" grpId="0" nodeType="withEffect">
+                                  <p:stCondLst>
+                                    <p:cond delay="0"/>
+                                  </p:stCondLst>
+                                  <p:childTnLst>
+                                    <p:set>
+                                      <p:cBhvr>
+                                        <p:cTn id="16" dur="1" fill="hold">
+                                          <p:stCondLst>
+                                            <p:cond delay="0"/>
+                                          </p:stCondLst>
+                                        </p:cTn>
+                                        <p:tgtEl>
+                                          <p:spTgt spid="34"/>
+                                        </p:tgtEl>
+                                        <p:attrNameLst>
+                                          <p:attrName>style.visibility</p:attrName>
+                                        </p:attrNameLst>
+                                      </p:cBhvr>
+                                      <p:to>
+                                        <p:strVal val="visible"/>
+                                      </p:to>
+                                    </p:set>
+                                  </p:childTnLst>
+                                </p:cTn>
+                              </p:par>
+                              <p:par>
+                                <p:cTn id="17" presetID="1" presetClass="entr" presetSubtype="0" fill="hold" grpId="0" nodeType="withEffect">
+                                  <p:stCondLst>
+                                    <p:cond delay="0"/>
+                                  </p:stCondLst>
+                                  <p:childTnLst>
+                                    <p:set>
+                                      <p:cBhvr>
+                                        <p:cTn id="18" dur="1" fill="hold">
+                                          <p:stCondLst>
+                                            <p:cond delay="0"/>
+                                          </p:stCondLst>
+                                        </p:cTn>
+                                        <p:tgtEl>
+                                          <p:spTgt spid="35"/>
+                                        </p:tgtEl>
+                                        <p:attrNameLst>
+                                          <p:attrName>style.visibility</p:attrName>
+                                        </p:attrNameLst>
+                                      </p:cBhvr>
+                                      <p:to>
+                                        <p:strVal val="visible"/>
+                                      </p:to>
+                                    </p:set>
+                                  </p:childTnLst>
+                                </p:cTn>
+                              </p:par>
+                              <p:par>
+                                <p:cTn id="19" presetID="1" presetClass="entr" presetSubtype="0" fill="hold" grpId="0" nodeType="withEffect">
+                                  <p:stCondLst>
+                                    <p:cond delay="0"/>
+                                  </p:stCondLst>
+                                  <p:childTnLst>
+                                    <p:set>
+                                      <p:cBhvr>
+                                        <p:cTn id="20" dur="1" fill="hold">
+                                          <p:stCondLst>
+                                            <p:cond delay="0"/>
+                                          </p:stCondLst>
+                                        </p:cTn>
+                                        <p:tgtEl>
+                                          <p:spTgt spid="37"/>
+                                        </p:tgtEl>
+                                        <p:attrNameLst>
+                                          <p:attrName>style.visibility</p:attrName>
+                                        </p:attrNameLst>
+                                      </p:cBhvr>
+                                      <p:to>
+                                        <p:strVal val="visible"/>
+                                      </p:to>
+                                    </p:set>
+                                  </p:childTnLst>
+                                </p:cTn>
+                              </p:par>
+                              <p:par>
+                                <p:cTn id="21" presetID="1" presetClass="entr" presetSubtype="0" fill="hold" grpId="0" nodeType="withEffect">
+                                  <p:stCondLst>
+                                    <p:cond delay="0"/>
+                                  </p:stCondLst>
+                                  <p:childTnLst>
+                                    <p:set>
+                                      <p:cBhvr>
+                                        <p:cTn id="22" dur="1" fill="hold">
+                                          <p:stCondLst>
+                                            <p:cond delay="0"/>
+                                          </p:stCondLst>
+                                        </p:cTn>
+                                        <p:tgtEl>
+                                          <p:spTgt spid="38"/>
+                                        </p:tgtEl>
+                                        <p:attrNameLst>
+                                          <p:attrName>style.visibility</p:attrName>
+                                        </p:attrNameLst>
+                                      </p:cBhvr>
+                                      <p:to>
+                                        <p:strVal val="visible"/>
+                                      </p:to>
+                                    </p:set>
+                                  </p:childTnLst>
+                                </p:cTn>
+                              </p:par>
+                              <p:par>
+                                <p:cTn id="23" presetID="1" presetClass="entr" presetSubtype="0" fill="hold" grpId="0" nodeType="withEffect">
+                                  <p:stCondLst>
+                                    <p:cond delay="0"/>
+                                  </p:stCondLst>
+                                  <p:childTnLst>
+                                    <p:set>
+                                      <p:cBhvr>
+                                        <p:cTn id="24" dur="1" fill="hold">
+                                          <p:stCondLst>
+                                            <p:cond delay="0"/>
+                                          </p:stCondLst>
+                                        </p:cTn>
+                                        <p:tgtEl>
+                                          <p:spTgt spid="40"/>
+                                        </p:tgtEl>
+                                        <p:attrNameLst>
+                                          <p:attrName>style.visibility</p:attrName>
+                                        </p:attrNameLst>
+                                      </p:cBhvr>
+                                      <p:to>
+                                        <p:strVal val="visible"/>
+                                      </p:to>
+                                    </p:set>
+                                  </p:childTnLst>
+                                </p:cTn>
+                              </p:par>
+                              <p:par>
+                                <p:cTn id="25" presetID="1" presetClass="entr" presetSubtype="0" fill="hold" nodeType="withEffect">
+                                  <p:stCondLst>
+                                    <p:cond delay="0"/>
+                                  </p:stCondLst>
+                                  <p:childTnLst>
+                                    <p:set>
+                                      <p:cBhvr>
+                                        <p:cTn id="26" dur="1" fill="hold">
+                                          <p:stCondLst>
+                                            <p:cond delay="0"/>
+                                          </p:stCondLst>
+                                        </p:cTn>
+                                        <p:tgtEl>
+                                          <p:spTgt spid="17"/>
+                                        </p:tgtEl>
+                                        <p:attrNameLst>
+                                          <p:attrName>style.visibility</p:attrName>
+                                        </p:attrNameLst>
+                                      </p:cBhvr>
+                                      <p:to>
+                                        <p:strVal val="visible"/>
+                                      </p:to>
+                                    </p:set>
+                                  </p:childTnLst>
+                                </p:cTn>
+                              </p:par>
+                              <p:par>
+                                <p:cTn id="27" presetID="1" presetClass="entr" presetSubtype="0" fill="hold" nodeType="withEffect">
+                                  <p:stCondLst>
+                                    <p:cond delay="0"/>
+                                  </p:stCondLst>
+                                  <p:childTnLst>
+                                    <p:set>
+                                      <p:cBhvr>
+                                        <p:cTn id="28" dur="1" fill="hold">
+                                          <p:stCondLst>
+                                            <p:cond delay="0"/>
+                                          </p:stCondLst>
+                                        </p:cTn>
+                                        <p:tgtEl>
+                                          <p:spTgt spid="22"/>
+                                        </p:tgtEl>
+                                        <p:attrNameLst>
+                                          <p:attrName>style.visibility</p:attrName>
+                                        </p:attrNameLst>
+                                      </p:cBhvr>
+                                      <p:to>
+                                        <p:strVal val="visible"/>
+                                      </p:to>
+                                    </p:set>
+                                  </p:childTnLst>
+                                </p:cTn>
+                              </p:par>
+                              <p:par>
+                                <p:cTn id="29" presetID="1" presetClass="entr" presetSubtype="0" fill="hold" nodeType="withEffect">
+                                  <p:stCondLst>
+                                    <p:cond delay="0"/>
+                                  </p:stCondLst>
+                                  <p:childTnLst>
+                                    <p:set>
+                                      <p:cBhvr>
+                                        <p:cTn id="30" dur="1" fill="hold">
+                                          <p:stCondLst>
+                                            <p:cond delay="0"/>
+                                          </p:stCondLst>
+                                        </p:cTn>
+                                        <p:tgtEl>
+                                          <p:spTgt spid="43"/>
+                                        </p:tgtEl>
+                                        <p:attrNameLst>
+                                          <p:attrName>style.visibility</p:attrName>
+                                        </p:attrNameLst>
+                                      </p:cBhvr>
+                                      <p:to>
+                                        <p:strVal val="visible"/>
+                                      </p:to>
+                                    </p:set>
+                                  </p:childTnLst>
+                                </p:cTn>
+                              </p:par>
+                              <p:par>
+                                <p:cTn id="31" presetID="1" presetClass="entr" presetSubtype="0" fill="hold" nodeType="withEffect">
+                                  <p:stCondLst>
+                                    <p:cond delay="0"/>
+                                  </p:stCondLst>
+                                  <p:childTnLst>
+                                    <p:set>
+                                      <p:cBhvr>
+                                        <p:cTn id="32" dur="1" fill="hold">
+                                          <p:stCondLst>
+                                            <p:cond delay="0"/>
+                                          </p:stCondLst>
+                                        </p:cTn>
+                                        <p:tgtEl>
+                                          <p:spTgt spid="47"/>
+                                        </p:tgtEl>
+                                        <p:attrNameLst>
+                                          <p:attrName>style.visibility</p:attrName>
+                                        </p:attrNameLst>
+                                      </p:cBhvr>
+                                      <p:to>
+                                        <p:strVal val="visible"/>
+                                      </p:to>
+                                    </p:set>
+                                  </p:childTnLst>
+                                </p:cTn>
+                              </p:par>
+                              <p:par>
+                                <p:cTn id="33" presetID="1" presetClass="entr" presetSubtype="0" fill="hold" grpId="0" nodeType="withEffect">
+                                  <p:stCondLst>
+                                    <p:cond delay="0"/>
+                                  </p:stCondLst>
+                                  <p:childTnLst>
+                                    <p:set>
+                                      <p:cBhvr>
+                                        <p:cTn id="34" dur="1" fill="hold">
+                                          <p:stCondLst>
+                                            <p:cond delay="0"/>
+                                          </p:stCondLst>
+                                        </p:cTn>
+                                        <p:tgtEl>
+                                          <p:spTgt spid="71"/>
+                                        </p:tgtEl>
+                                        <p:attrNameLst>
+                                          <p:attrName>style.visibility</p:attrName>
+                                        </p:attrNameLst>
+                                      </p:cBhvr>
+                                      <p:to>
+                                        <p:strVal val="visible"/>
+                                      </p:to>
+                                    </p:set>
+                                  </p:childTnLst>
+                                </p:cTn>
+                              </p:par>
+                              <p:par>
+                                <p:cTn id="35" presetID="1" presetClass="entr" presetSubtype="0" fill="hold" nodeType="withEffect">
+                                  <p:stCondLst>
+                                    <p:cond delay="0"/>
+                                  </p:stCondLst>
+                                  <p:childTnLst>
+                                    <p:set>
+                                      <p:cBhvr>
+                                        <p:cTn id="36" dur="1" fill="hold">
+                                          <p:stCondLst>
+                                            <p:cond delay="0"/>
+                                          </p:stCondLst>
+                                        </p:cTn>
+                                        <p:tgtEl>
+                                          <p:spTgt spid="73"/>
+                                        </p:tgtEl>
+                                        <p:attrNameLst>
+                                          <p:attrName>style.visibility</p:attrName>
+                                        </p:attrNameLst>
+                                      </p:cBhvr>
+                                      <p:to>
+                                        <p:strVal val="visible"/>
+                                      </p:to>
+                                    </p:set>
+                                  </p:childTnLst>
+                                </p:cTn>
+                              </p:par>
+                              <p:par>
+                                <p:cTn id="37" presetID="1" presetClass="entr" presetSubtype="0" fill="hold" nodeType="withEffect">
+                                  <p:stCondLst>
+                                    <p:cond delay="0"/>
+                                  </p:stCondLst>
+                                  <p:childTnLst>
+                                    <p:set>
+                                      <p:cBhvr>
+                                        <p:cTn id="38" dur="1" fill="hold">
+                                          <p:stCondLst>
+                                            <p:cond delay="0"/>
+                                          </p:stCondLst>
+                                        </p:cTn>
+                                        <p:tgtEl>
+                                          <p:spTgt spid="85"/>
+                                        </p:tgtEl>
+                                        <p:attrNameLst>
+                                          <p:attrName>style.visibility</p:attrName>
+                                        </p:attrNameLst>
+                                      </p:cBhvr>
+                                      <p:to>
+                                        <p:strVal val="visible"/>
+                                      </p:to>
+                                    </p:set>
+                                  </p:childTnLst>
+                                </p:cTn>
+                              </p:par>
+                            </p:childTnLst>
+                          </p:cTn>
+                        </p:par>
+                      </p:childTnLst>
+                    </p:cTn>
+                  </p:par>
+                  <p:par>
+                    <p:cTn id="39" fill="hold">
+                      <p:stCondLst>
+                        <p:cond delay="indefinite"/>
+                      </p:stCondLst>
+                      <p:childTnLst>
+                        <p:par>
+                          <p:cTn id="40" fill="hold">
+                            <p:stCondLst>
+                              <p:cond delay="0"/>
+                            </p:stCondLst>
+                            <p:childTnLst>
+                              <p:par>
+                                <p:cTn id="41" presetID="1" presetClass="entr" presetSubtype="0" fill="hold" grpId="0" nodeType="clickEffect">
+                                  <p:stCondLst>
+                                    <p:cond delay="0"/>
+                                  </p:stCondLst>
+                                  <p:childTnLst>
+                                    <p:set>
+                                      <p:cBhvr>
+                                        <p:cTn id="42" dur="1" fill="hold">
+                                          <p:stCondLst>
+                                            <p:cond delay="0"/>
+                                          </p:stCondLst>
+                                        </p:cTn>
+                                        <p:tgtEl>
+                                          <p:spTgt spid="25"/>
+                                        </p:tgtEl>
+                                        <p:attrNameLst>
+                                          <p:attrName>style.visibility</p:attrName>
+                                        </p:attrNameLst>
+                                      </p:cBhvr>
+                                      <p:to>
+                                        <p:strVal val="visible"/>
+                                      </p:to>
+                                    </p:set>
+                                  </p:childTnLst>
+                                </p:cTn>
+                              </p:par>
+                              <p:par>
+                                <p:cTn id="43" presetID="1" presetClass="entr" presetSubtype="0" fill="hold" grpId="0" nodeType="withEffect">
+                                  <p:stCondLst>
+                                    <p:cond delay="0"/>
+                                  </p:stCondLst>
+                                  <p:childTnLst>
+                                    <p:set>
+                                      <p:cBhvr>
+                                        <p:cTn id="44" dur="1" fill="hold">
+                                          <p:stCondLst>
+                                            <p:cond delay="0"/>
+                                          </p:stCondLst>
+                                        </p:cTn>
+                                        <p:tgtEl>
+                                          <p:spTgt spid="28"/>
+                                        </p:tgtEl>
+                                        <p:attrNameLst>
+                                          <p:attrName>style.visibility</p:attrName>
+                                        </p:attrNameLst>
+                                      </p:cBhvr>
+                                      <p:to>
+                                        <p:strVal val="visible"/>
+                                      </p:to>
+                                    </p:set>
+                                  </p:childTnLst>
+                                </p:cTn>
+                              </p:par>
+                              <p:par>
+                                <p:cTn id="45" presetID="1" presetClass="entr" presetSubtype="0" fill="hold" nodeType="withEffect">
+                                  <p:stCondLst>
+                                    <p:cond delay="0"/>
+                                  </p:stCondLst>
+                                  <p:childTnLst>
+                                    <p:set>
+                                      <p:cBhvr>
+                                        <p:cTn id="46" dur="1" fill="hold">
+                                          <p:stCondLst>
+                                            <p:cond delay="0"/>
+                                          </p:stCondLst>
+                                        </p:cTn>
+                                        <p:tgtEl>
+                                          <p:spTgt spid="81"/>
+                                        </p:tgtEl>
+                                        <p:attrNameLst>
+                                          <p:attrName>style.visibility</p:attrName>
+                                        </p:attrNameLst>
+                                      </p:cBhvr>
+                                      <p:to>
+                                        <p:strVal val="visible"/>
+                                      </p:to>
+                                    </p:set>
+                                  </p:childTnLst>
+                                </p:cTn>
+                              </p:par>
+                            </p:childTnLst>
+                          </p:cTn>
+                        </p:par>
+                      </p:childTnLst>
+                    </p:cTn>
+                  </p:par>
                 </p:childTnLst>
               </p:cTn>
               <p:prevCondLst>
@@ -15724,6 +17274,15 @@
     </p:tnLst>
     <p:bldLst>
       <p:bldP spid="20" grpId="0" animBg="1"/>
+      <p:bldP spid="15" grpId="0"/>
+      <p:bldP spid="25" grpId="0"/>
+      <p:bldP spid="28" grpId="0"/>
+      <p:bldP spid="34" grpId="0"/>
+      <p:bldP spid="35" grpId="0"/>
+      <p:bldP spid="37" grpId="0"/>
+      <p:bldP spid="38" grpId="0"/>
+      <p:bldP spid="40" grpId="0"/>
+      <p:bldP spid="71" grpId="0"/>
     </p:bldLst>
   </p:timing>
 </p:sld>
@@ -18148,7 +19707,7 @@
           <a:p>
             <a:fld id="{3E0D62B3-D024-40DB-B196-B83DB830D8AF}" type="datetime1">
               <a:rPr lang="en-GB" smtClean="0"/>
-              <a:t>01/06/2021</a:t>
+              <a:t>03/06/2021</a:t>
             </a:fld>
             <a:endParaRPr lang="de-CH"/>
           </a:p>

</xml_diff>